<commit_message>
db is now filled, Powerpoint extended
</commit_message>
<xml_diff>
--- a/Präsentation/Web Crawling.pptx
+++ b/Präsentation/Web Crawling.pptx
@@ -4,19 +4,23 @@
   <p:sldMasterIdLst>
     <p:sldMasterId id="2147483695" r:id="rId1"/>
   </p:sldMasterIdLst>
+  <p:notesMasterIdLst>
+    <p:notesMasterId r:id="rId15"/>
+  </p:notesMasterIdLst>
   <p:sldIdLst>
     <p:sldId id="256" r:id="rId2"/>
-    <p:sldId id="257" r:id="rId3"/>
-    <p:sldId id="258" r:id="rId4"/>
-    <p:sldId id="262" r:id="rId5"/>
-    <p:sldId id="265" r:id="rId6"/>
-    <p:sldId id="259" r:id="rId7"/>
-    <p:sldId id="260" r:id="rId8"/>
+    <p:sldId id="260" r:id="rId3"/>
+    <p:sldId id="269" r:id="rId4"/>
+    <p:sldId id="257" r:id="rId5"/>
+    <p:sldId id="270" r:id="rId6"/>
+    <p:sldId id="272" r:id="rId7"/>
+    <p:sldId id="274" r:id="rId8"/>
     <p:sldId id="261" r:id="rId9"/>
-    <p:sldId id="267" r:id="rId10"/>
-    <p:sldId id="268" r:id="rId11"/>
-    <p:sldId id="263" r:id="rId12"/>
-    <p:sldId id="266" r:id="rId13"/>
+    <p:sldId id="273" r:id="rId10"/>
+    <p:sldId id="263" r:id="rId11"/>
+    <p:sldId id="275" r:id="rId12"/>
+    <p:sldId id="268" r:id="rId13"/>
+    <p:sldId id="266" r:id="rId14"/>
   </p:sldIdLst>
   <p:sldSz cx="12192000" cy="6858000"/>
   <p:notesSz cx="6858000" cy="9144000"/>
@@ -115,7 +119,655 @@
       </a:defRPr>
     </a:lvl9pPr>
   </p:defaultTextStyle>
+  <p:extLst>
+    <p:ext uri="{EFAFB233-063F-42B5-8137-9DF3F51BA10A}">
+      <p15:sldGuideLst xmlns:p15="http://schemas.microsoft.com/office/powerpoint/2012/main"/>
+    </p:ext>
+  </p:extLst>
 </p:presentation>
+</file>
+
+<file path=ppt/notesMasters/notesMaster1.xml><?xml version="1.0" encoding="utf-8"?>
+<p:notesMaster xmlns:a="http://schemas.openxmlformats.org/drawingml/2006/main" xmlns:r="http://schemas.openxmlformats.org/officeDocument/2006/relationships" xmlns:p="http://schemas.openxmlformats.org/presentationml/2006/main">
+  <p:cSld>
+    <p:bg>
+      <p:bgRef idx="1001">
+        <a:schemeClr val="bg1"/>
+      </p:bgRef>
+    </p:bg>
+    <p:spTree>
+      <p:nvGrpSpPr>
+        <p:cNvPr id="1" name=""/>
+        <p:cNvGrpSpPr/>
+        <p:nvPr/>
+      </p:nvGrpSpPr>
+      <p:grpSpPr>
+        <a:xfrm>
+          <a:off x="0" y="0"/>
+          <a:ext cx="0" cy="0"/>
+          <a:chOff x="0" y="0"/>
+          <a:chExt cx="0" cy="0"/>
+        </a:xfrm>
+      </p:grpSpPr>
+      <p:sp>
+        <p:nvSpPr>
+          <p:cNvPr id="2" name="Header Placeholder 1"/>
+          <p:cNvSpPr>
+            <a:spLocks noGrp="1"/>
+          </p:cNvSpPr>
+          <p:nvPr>
+            <p:ph type="hdr" sz="quarter"/>
+          </p:nvPr>
+        </p:nvSpPr>
+        <p:spPr>
+          <a:xfrm>
+            <a:off x="0" y="0"/>
+            <a:ext cx="2971800" cy="458788"/>
+          </a:xfrm>
+          <a:prstGeom prst="rect">
+            <a:avLst/>
+          </a:prstGeom>
+        </p:spPr>
+        <p:txBody>
+          <a:bodyPr vert="horz" lIns="91440" tIns="45720" rIns="91440" bIns="45720" rtlCol="0"/>
+          <a:lstStyle>
+            <a:lvl1pPr algn="l">
+              <a:defRPr sz="1200"/>
+            </a:lvl1pPr>
+          </a:lstStyle>
+          <a:p>
+            <a:endParaRPr lang="en-US"/>
+          </a:p>
+        </p:txBody>
+      </p:sp>
+      <p:sp>
+        <p:nvSpPr>
+          <p:cNvPr id="3" name="Date Placeholder 2"/>
+          <p:cNvSpPr>
+            <a:spLocks noGrp="1"/>
+          </p:cNvSpPr>
+          <p:nvPr>
+            <p:ph type="dt" idx="1"/>
+          </p:nvPr>
+        </p:nvSpPr>
+        <p:spPr>
+          <a:xfrm>
+            <a:off x="3884613" y="0"/>
+            <a:ext cx="2971800" cy="458788"/>
+          </a:xfrm>
+          <a:prstGeom prst="rect">
+            <a:avLst/>
+          </a:prstGeom>
+        </p:spPr>
+        <p:txBody>
+          <a:bodyPr vert="horz" lIns="91440" tIns="45720" rIns="91440" bIns="45720" rtlCol="0"/>
+          <a:lstStyle>
+            <a:lvl1pPr algn="r">
+              <a:defRPr sz="1200"/>
+            </a:lvl1pPr>
+          </a:lstStyle>
+          <a:p>
+            <a:fld id="{713ABC4F-8168-401F-A6D4-73FBD6B4C37E}" type="datetimeFigureOut">
+              <a:rPr lang="en-US" smtClean="0"/>
+              <a:t>5/21/2019</a:t>
+            </a:fld>
+            <a:endParaRPr lang="en-US"/>
+          </a:p>
+        </p:txBody>
+      </p:sp>
+      <p:sp>
+        <p:nvSpPr>
+          <p:cNvPr id="4" name="Slide Image Placeholder 3"/>
+          <p:cNvSpPr>
+            <a:spLocks noGrp="1" noRot="1" noChangeAspect="1"/>
+          </p:cNvSpPr>
+          <p:nvPr>
+            <p:ph type="sldImg" idx="2"/>
+          </p:nvPr>
+        </p:nvSpPr>
+        <p:spPr>
+          <a:xfrm>
+            <a:off x="685800" y="1143000"/>
+            <a:ext cx="5486400" cy="3086100"/>
+          </a:xfrm>
+          <a:prstGeom prst="rect">
+            <a:avLst/>
+          </a:prstGeom>
+          <a:noFill/>
+          <a:ln w="12700">
+            <a:solidFill>
+              <a:prstClr val="black"/>
+            </a:solidFill>
+          </a:ln>
+        </p:spPr>
+        <p:txBody>
+          <a:bodyPr vert="horz" lIns="91440" tIns="45720" rIns="91440" bIns="45720" rtlCol="0" anchor="ctr"/>
+          <a:lstStyle/>
+          <a:p>
+            <a:endParaRPr lang="en-US"/>
+          </a:p>
+        </p:txBody>
+      </p:sp>
+      <p:sp>
+        <p:nvSpPr>
+          <p:cNvPr id="5" name="Notes Placeholder 4"/>
+          <p:cNvSpPr>
+            <a:spLocks noGrp="1"/>
+          </p:cNvSpPr>
+          <p:nvPr>
+            <p:ph type="body" sz="quarter" idx="3"/>
+          </p:nvPr>
+        </p:nvSpPr>
+        <p:spPr>
+          <a:xfrm>
+            <a:off x="685800" y="4400550"/>
+            <a:ext cx="5486400" cy="3600450"/>
+          </a:xfrm>
+          <a:prstGeom prst="rect">
+            <a:avLst/>
+          </a:prstGeom>
+        </p:spPr>
+        <p:txBody>
+          <a:bodyPr vert="horz" lIns="91440" tIns="45720" rIns="91440" bIns="45720" rtlCol="0"/>
+          <a:lstStyle/>
+          <a:p>
+            <a:pPr lvl="0"/>
+            <a:r>
+              <a:rPr lang="en-US"/>
+              <a:t>Click to edit Master text styles</a:t>
+            </a:r>
+          </a:p>
+          <a:p>
+            <a:pPr lvl="1"/>
+            <a:r>
+              <a:rPr lang="en-US"/>
+              <a:t>Second level</a:t>
+            </a:r>
+          </a:p>
+          <a:p>
+            <a:pPr lvl="2"/>
+            <a:r>
+              <a:rPr lang="en-US"/>
+              <a:t>Third level</a:t>
+            </a:r>
+          </a:p>
+          <a:p>
+            <a:pPr lvl="3"/>
+            <a:r>
+              <a:rPr lang="en-US"/>
+              <a:t>Fourth level</a:t>
+            </a:r>
+          </a:p>
+          <a:p>
+            <a:pPr lvl="4"/>
+            <a:r>
+              <a:rPr lang="en-US"/>
+              <a:t>Fifth level</a:t>
+            </a:r>
+          </a:p>
+        </p:txBody>
+      </p:sp>
+      <p:sp>
+        <p:nvSpPr>
+          <p:cNvPr id="6" name="Footer Placeholder 5"/>
+          <p:cNvSpPr>
+            <a:spLocks noGrp="1"/>
+          </p:cNvSpPr>
+          <p:nvPr>
+            <p:ph type="ftr" sz="quarter" idx="4"/>
+          </p:nvPr>
+        </p:nvSpPr>
+        <p:spPr>
+          <a:xfrm>
+            <a:off x="0" y="8685213"/>
+            <a:ext cx="2971800" cy="458787"/>
+          </a:xfrm>
+          <a:prstGeom prst="rect">
+            <a:avLst/>
+          </a:prstGeom>
+        </p:spPr>
+        <p:txBody>
+          <a:bodyPr vert="horz" lIns="91440" tIns="45720" rIns="91440" bIns="45720" rtlCol="0" anchor="b"/>
+          <a:lstStyle>
+            <a:lvl1pPr algn="l">
+              <a:defRPr sz="1200"/>
+            </a:lvl1pPr>
+          </a:lstStyle>
+          <a:p>
+            <a:endParaRPr lang="en-US"/>
+          </a:p>
+        </p:txBody>
+      </p:sp>
+      <p:sp>
+        <p:nvSpPr>
+          <p:cNvPr id="7" name="Slide Number Placeholder 6"/>
+          <p:cNvSpPr>
+            <a:spLocks noGrp="1"/>
+          </p:cNvSpPr>
+          <p:nvPr>
+            <p:ph type="sldNum" sz="quarter" idx="5"/>
+          </p:nvPr>
+        </p:nvSpPr>
+        <p:spPr>
+          <a:xfrm>
+            <a:off x="3884613" y="8685213"/>
+            <a:ext cx="2971800" cy="458787"/>
+          </a:xfrm>
+          <a:prstGeom prst="rect">
+            <a:avLst/>
+          </a:prstGeom>
+        </p:spPr>
+        <p:txBody>
+          <a:bodyPr vert="horz" lIns="91440" tIns="45720" rIns="91440" bIns="45720" rtlCol="0" anchor="b"/>
+          <a:lstStyle>
+            <a:lvl1pPr algn="r">
+              <a:defRPr sz="1200"/>
+            </a:lvl1pPr>
+          </a:lstStyle>
+          <a:p>
+            <a:fld id="{D34DEEB7-DC8F-4A06-B009-4CCDF6AF2963}" type="slidenum">
+              <a:rPr lang="en-US" smtClean="0"/>
+              <a:t>‹#›</a:t>
+            </a:fld>
+            <a:endParaRPr lang="en-US"/>
+          </a:p>
+        </p:txBody>
+      </p:sp>
+    </p:spTree>
+    <p:extLst>
+      <p:ext uri="{BB962C8B-B14F-4D97-AF65-F5344CB8AC3E}">
+        <p14:creationId xmlns:p14="http://schemas.microsoft.com/office/powerpoint/2010/main" val="2878120422"/>
+      </p:ext>
+    </p:extLst>
+  </p:cSld>
+  <p:clrMap bg1="lt1" tx1="dk1" bg2="lt2" tx2="dk2" accent1="accent1" accent2="accent2" accent3="accent3" accent4="accent4" accent5="accent5" accent6="accent6" hlink="hlink" folHlink="folHlink"/>
+  <p:notesStyle>
+    <a:lvl1pPr marL="0" algn="l" defTabSz="914400" rtl="0" eaLnBrk="1" latinLnBrk="0" hangingPunct="1">
+      <a:defRPr sz="1200" kern="1200">
+        <a:solidFill>
+          <a:schemeClr val="tx1"/>
+        </a:solidFill>
+        <a:latin typeface="+mn-lt"/>
+        <a:ea typeface="+mn-ea"/>
+        <a:cs typeface="+mn-cs"/>
+      </a:defRPr>
+    </a:lvl1pPr>
+    <a:lvl2pPr marL="457200" algn="l" defTabSz="914400" rtl="0" eaLnBrk="1" latinLnBrk="0" hangingPunct="1">
+      <a:defRPr sz="1200" kern="1200">
+        <a:solidFill>
+          <a:schemeClr val="tx1"/>
+        </a:solidFill>
+        <a:latin typeface="+mn-lt"/>
+        <a:ea typeface="+mn-ea"/>
+        <a:cs typeface="+mn-cs"/>
+      </a:defRPr>
+    </a:lvl2pPr>
+    <a:lvl3pPr marL="914400" algn="l" defTabSz="914400" rtl="0" eaLnBrk="1" latinLnBrk="0" hangingPunct="1">
+      <a:defRPr sz="1200" kern="1200">
+        <a:solidFill>
+          <a:schemeClr val="tx1"/>
+        </a:solidFill>
+        <a:latin typeface="+mn-lt"/>
+        <a:ea typeface="+mn-ea"/>
+        <a:cs typeface="+mn-cs"/>
+      </a:defRPr>
+    </a:lvl3pPr>
+    <a:lvl4pPr marL="1371600" algn="l" defTabSz="914400" rtl="0" eaLnBrk="1" latinLnBrk="0" hangingPunct="1">
+      <a:defRPr sz="1200" kern="1200">
+        <a:solidFill>
+          <a:schemeClr val="tx1"/>
+        </a:solidFill>
+        <a:latin typeface="+mn-lt"/>
+        <a:ea typeface="+mn-ea"/>
+        <a:cs typeface="+mn-cs"/>
+      </a:defRPr>
+    </a:lvl4pPr>
+    <a:lvl5pPr marL="1828800" algn="l" defTabSz="914400" rtl="0" eaLnBrk="1" latinLnBrk="0" hangingPunct="1">
+      <a:defRPr sz="1200" kern="1200">
+        <a:solidFill>
+          <a:schemeClr val="tx1"/>
+        </a:solidFill>
+        <a:latin typeface="+mn-lt"/>
+        <a:ea typeface="+mn-ea"/>
+        <a:cs typeface="+mn-cs"/>
+      </a:defRPr>
+    </a:lvl5pPr>
+    <a:lvl6pPr marL="2286000" algn="l" defTabSz="914400" rtl="0" eaLnBrk="1" latinLnBrk="0" hangingPunct="1">
+      <a:defRPr sz="1200" kern="1200">
+        <a:solidFill>
+          <a:schemeClr val="tx1"/>
+        </a:solidFill>
+        <a:latin typeface="+mn-lt"/>
+        <a:ea typeface="+mn-ea"/>
+        <a:cs typeface="+mn-cs"/>
+      </a:defRPr>
+    </a:lvl6pPr>
+    <a:lvl7pPr marL="2743200" algn="l" defTabSz="914400" rtl="0" eaLnBrk="1" latinLnBrk="0" hangingPunct="1">
+      <a:defRPr sz="1200" kern="1200">
+        <a:solidFill>
+          <a:schemeClr val="tx1"/>
+        </a:solidFill>
+        <a:latin typeface="+mn-lt"/>
+        <a:ea typeface="+mn-ea"/>
+        <a:cs typeface="+mn-cs"/>
+      </a:defRPr>
+    </a:lvl7pPr>
+    <a:lvl8pPr marL="3200400" algn="l" defTabSz="914400" rtl="0" eaLnBrk="1" latinLnBrk="0" hangingPunct="1">
+      <a:defRPr sz="1200" kern="1200">
+        <a:solidFill>
+          <a:schemeClr val="tx1"/>
+        </a:solidFill>
+        <a:latin typeface="+mn-lt"/>
+        <a:ea typeface="+mn-ea"/>
+        <a:cs typeface="+mn-cs"/>
+      </a:defRPr>
+    </a:lvl8pPr>
+    <a:lvl9pPr marL="3657600" algn="l" defTabSz="914400" rtl="0" eaLnBrk="1" latinLnBrk="0" hangingPunct="1">
+      <a:defRPr sz="1200" kern="1200">
+        <a:solidFill>
+          <a:schemeClr val="tx1"/>
+        </a:solidFill>
+        <a:latin typeface="+mn-lt"/>
+        <a:ea typeface="+mn-ea"/>
+        <a:cs typeface="+mn-cs"/>
+      </a:defRPr>
+    </a:lvl9pPr>
+  </p:notesStyle>
+</p:notesMaster>
+</file>
+
+<file path=ppt/notesSlides/notesSlide1.xml><?xml version="1.0" encoding="utf-8"?>
+<p:notes xmlns:a="http://schemas.openxmlformats.org/drawingml/2006/main" xmlns:r="http://schemas.openxmlformats.org/officeDocument/2006/relationships" xmlns:p="http://schemas.openxmlformats.org/presentationml/2006/main">
+  <p:cSld>
+    <p:spTree>
+      <p:nvGrpSpPr>
+        <p:cNvPr id="1" name=""/>
+        <p:cNvGrpSpPr/>
+        <p:nvPr/>
+      </p:nvGrpSpPr>
+      <p:grpSpPr>
+        <a:xfrm>
+          <a:off x="0" y="0"/>
+          <a:ext cx="0" cy="0"/>
+          <a:chOff x="0" y="0"/>
+          <a:chExt cx="0" cy="0"/>
+        </a:xfrm>
+      </p:grpSpPr>
+      <p:sp>
+        <p:nvSpPr>
+          <p:cNvPr id="2" name="Slide Image Placeholder 1"/>
+          <p:cNvSpPr>
+            <a:spLocks noGrp="1" noRot="1" noChangeAspect="1"/>
+          </p:cNvSpPr>
+          <p:nvPr>
+            <p:ph type="sldImg"/>
+          </p:nvPr>
+        </p:nvSpPr>
+        <p:spPr/>
+      </p:sp>
+      <p:sp>
+        <p:nvSpPr>
+          <p:cNvPr id="3" name="Notes Placeholder 2"/>
+          <p:cNvSpPr>
+            <a:spLocks noGrp="1"/>
+          </p:cNvSpPr>
+          <p:nvPr>
+            <p:ph type="body" idx="1"/>
+          </p:nvPr>
+        </p:nvSpPr>
+        <p:spPr/>
+        <p:txBody>
+          <a:bodyPr/>
+          <a:lstStyle/>
+          <a:p>
+            <a:r>
+              <a:rPr lang="de-DE" dirty="0" err="1"/>
+              <a:t>Cms</a:t>
+            </a:r>
+            <a:r>
+              <a:rPr lang="de-DE" dirty="0"/>
+              <a:t> erklären, auf Statistik eingehen</a:t>
+            </a:r>
+            <a:endParaRPr lang="en-US" dirty="0"/>
+          </a:p>
+        </p:txBody>
+      </p:sp>
+      <p:sp>
+        <p:nvSpPr>
+          <p:cNvPr id="4" name="Slide Number Placeholder 3"/>
+          <p:cNvSpPr>
+            <a:spLocks noGrp="1"/>
+          </p:cNvSpPr>
+          <p:nvPr>
+            <p:ph type="sldNum" sz="quarter" idx="5"/>
+          </p:nvPr>
+        </p:nvSpPr>
+        <p:spPr/>
+        <p:txBody>
+          <a:bodyPr/>
+          <a:lstStyle/>
+          <a:p>
+            <a:fld id="{D34DEEB7-DC8F-4A06-B009-4CCDF6AF2963}" type="slidenum">
+              <a:rPr lang="en-US" smtClean="0"/>
+              <a:t>2</a:t>
+            </a:fld>
+            <a:endParaRPr lang="en-US"/>
+          </a:p>
+        </p:txBody>
+      </p:sp>
+    </p:spTree>
+    <p:extLst>
+      <p:ext uri="{BB962C8B-B14F-4D97-AF65-F5344CB8AC3E}">
+        <p14:creationId xmlns:p14="http://schemas.microsoft.com/office/powerpoint/2010/main" val="3337995427"/>
+      </p:ext>
+    </p:extLst>
+  </p:cSld>
+  <p:clrMapOvr>
+    <a:masterClrMapping/>
+  </p:clrMapOvr>
+</p:notes>
+</file>
+
+<file path=ppt/notesSlides/notesSlide2.xml><?xml version="1.0" encoding="utf-8"?>
+<p:notes xmlns:a="http://schemas.openxmlformats.org/drawingml/2006/main" xmlns:r="http://schemas.openxmlformats.org/officeDocument/2006/relationships" xmlns:p="http://schemas.openxmlformats.org/presentationml/2006/main">
+  <p:cSld>
+    <p:spTree>
+      <p:nvGrpSpPr>
+        <p:cNvPr id="1" name=""/>
+        <p:cNvGrpSpPr/>
+        <p:nvPr/>
+      </p:nvGrpSpPr>
+      <p:grpSpPr>
+        <a:xfrm>
+          <a:off x="0" y="0"/>
+          <a:ext cx="0" cy="0"/>
+          <a:chOff x="0" y="0"/>
+          <a:chExt cx="0" cy="0"/>
+        </a:xfrm>
+      </p:grpSpPr>
+      <p:sp>
+        <p:nvSpPr>
+          <p:cNvPr id="2" name="Slide Image Placeholder 1"/>
+          <p:cNvSpPr>
+            <a:spLocks noGrp="1" noRot="1" noChangeAspect="1"/>
+          </p:cNvSpPr>
+          <p:nvPr>
+            <p:ph type="sldImg"/>
+          </p:nvPr>
+        </p:nvSpPr>
+        <p:spPr/>
+      </p:sp>
+      <p:sp>
+        <p:nvSpPr>
+          <p:cNvPr id="3" name="Notes Placeholder 2"/>
+          <p:cNvSpPr>
+            <a:spLocks noGrp="1"/>
+          </p:cNvSpPr>
+          <p:nvPr>
+            <p:ph type="body" idx="1"/>
+          </p:nvPr>
+        </p:nvSpPr>
+        <p:spPr/>
+        <p:txBody>
+          <a:bodyPr/>
+          <a:lstStyle/>
+          <a:p>
+            <a:endParaRPr lang="en-US" dirty="0"/>
+          </a:p>
+        </p:txBody>
+      </p:sp>
+      <p:sp>
+        <p:nvSpPr>
+          <p:cNvPr id="4" name="Slide Number Placeholder 3"/>
+          <p:cNvSpPr>
+            <a:spLocks noGrp="1"/>
+          </p:cNvSpPr>
+          <p:nvPr>
+            <p:ph type="sldNum" sz="quarter" idx="5"/>
+          </p:nvPr>
+        </p:nvSpPr>
+        <p:spPr/>
+        <p:txBody>
+          <a:bodyPr/>
+          <a:lstStyle/>
+          <a:p>
+            <a:fld id="{D34DEEB7-DC8F-4A06-B009-4CCDF6AF2963}" type="slidenum">
+              <a:rPr lang="en-US" smtClean="0"/>
+              <a:t>4</a:t>
+            </a:fld>
+            <a:endParaRPr lang="en-US"/>
+          </a:p>
+        </p:txBody>
+      </p:sp>
+    </p:spTree>
+    <p:extLst>
+      <p:ext uri="{BB962C8B-B14F-4D97-AF65-F5344CB8AC3E}">
+        <p14:creationId xmlns:p14="http://schemas.microsoft.com/office/powerpoint/2010/main" val="339849001"/>
+      </p:ext>
+    </p:extLst>
+  </p:cSld>
+  <p:clrMapOvr>
+    <a:masterClrMapping/>
+  </p:clrMapOvr>
+</p:notes>
+</file>
+
+<file path=ppt/notesSlides/notesSlide3.xml><?xml version="1.0" encoding="utf-8"?>
+<p:notes xmlns:a="http://schemas.openxmlformats.org/drawingml/2006/main" xmlns:r="http://schemas.openxmlformats.org/officeDocument/2006/relationships" xmlns:p="http://schemas.openxmlformats.org/presentationml/2006/main">
+  <p:cSld>
+    <p:spTree>
+      <p:nvGrpSpPr>
+        <p:cNvPr id="1" name=""/>
+        <p:cNvGrpSpPr/>
+        <p:nvPr/>
+      </p:nvGrpSpPr>
+      <p:grpSpPr>
+        <a:xfrm>
+          <a:off x="0" y="0"/>
+          <a:ext cx="0" cy="0"/>
+          <a:chOff x="0" y="0"/>
+          <a:chExt cx="0" cy="0"/>
+        </a:xfrm>
+      </p:grpSpPr>
+      <p:sp>
+        <p:nvSpPr>
+          <p:cNvPr id="2" name="Slide Image Placeholder 1"/>
+          <p:cNvSpPr>
+            <a:spLocks noGrp="1" noRot="1" noChangeAspect="1"/>
+          </p:cNvSpPr>
+          <p:nvPr>
+            <p:ph type="sldImg"/>
+          </p:nvPr>
+        </p:nvSpPr>
+        <p:spPr/>
+      </p:sp>
+      <p:sp>
+        <p:nvSpPr>
+          <p:cNvPr id="3" name="Notes Placeholder 2"/>
+          <p:cNvSpPr>
+            <a:spLocks noGrp="1"/>
+          </p:cNvSpPr>
+          <p:nvPr>
+            <p:ph type="body" idx="1"/>
+          </p:nvPr>
+        </p:nvSpPr>
+        <p:spPr/>
+        <p:txBody>
+          <a:bodyPr/>
+          <a:lstStyle/>
+          <a:p>
+            <a:pPr marL="171450" indent="-171450">
+              <a:buFont typeface="Arial" panose="020B0604020202020204" pitchFamily="34" charset="0"/>
+              <a:buChar char="•"/>
+            </a:pPr>
+            <a:r>
+              <a:rPr lang="de-DE" dirty="0"/>
+              <a:t>= </a:t>
+            </a:r>
+            <a:r>
+              <a:rPr lang="de-DE" dirty="0" err="1"/>
+              <a:t>for</a:t>
+            </a:r>
+            <a:r>
+              <a:rPr lang="de-DE" dirty="0"/>
+              <a:t> all </a:t>
+            </a:r>
+            <a:r>
+              <a:rPr lang="de-DE" dirty="0" err="1"/>
+              <a:t>search</a:t>
+            </a:r>
+            <a:r>
+              <a:rPr lang="de-DE" dirty="0"/>
+              <a:t> bots </a:t>
+            </a:r>
+          </a:p>
+          <a:p>
+            <a:pPr marL="171450" indent="-171450">
+              <a:buFont typeface="Arial" panose="020B0604020202020204" pitchFamily="34" charset="0"/>
+              <a:buChar char="•"/>
+            </a:pPr>
+            <a:r>
+              <a:rPr lang="de-DE" dirty="0" err="1"/>
+              <a:t>Diallow</a:t>
+            </a:r>
+            <a:endParaRPr lang="en-US" dirty="0"/>
+          </a:p>
+        </p:txBody>
+      </p:sp>
+      <p:sp>
+        <p:nvSpPr>
+          <p:cNvPr id="4" name="Slide Number Placeholder 3"/>
+          <p:cNvSpPr>
+            <a:spLocks noGrp="1"/>
+          </p:cNvSpPr>
+          <p:nvPr>
+            <p:ph type="sldNum" sz="quarter" idx="5"/>
+          </p:nvPr>
+        </p:nvSpPr>
+        <p:spPr/>
+        <p:txBody>
+          <a:bodyPr/>
+          <a:lstStyle/>
+          <a:p>
+            <a:fld id="{D34DEEB7-DC8F-4A06-B009-4CCDF6AF2963}" type="slidenum">
+              <a:rPr lang="en-US" smtClean="0"/>
+              <a:t>11</a:t>
+            </a:fld>
+            <a:endParaRPr lang="en-US"/>
+          </a:p>
+        </p:txBody>
+      </p:sp>
+    </p:spTree>
+    <p:extLst>
+      <p:ext uri="{BB962C8B-B14F-4D97-AF65-F5344CB8AC3E}">
+        <p14:creationId xmlns:p14="http://schemas.microsoft.com/office/powerpoint/2010/main" val="4148329790"/>
+      </p:ext>
+    </p:extLst>
+  </p:cSld>
+  <p:clrMapOvr>
+    <a:masterClrMapping/>
+  </p:clrMapOvr>
+</p:notes>
 </file>
 
 <file path=ppt/slideLayouts/slideLayout1.xml><?xml version="1.0" encoding="utf-8"?>
@@ -301,7 +953,7 @@
           <a:p>
             <a:fld id="{B4AEF157-6942-421D-9DEA-F58B3C8949A0}" type="datetimeFigureOut">
               <a:rPr lang="de-CH" smtClean="0"/>
-              <a:t>20.05.2019</a:t>
+              <a:t>21.05.2019</a:t>
             </a:fld>
             <a:endParaRPr lang="de-CH"/>
           </a:p>
@@ -343,7 +995,7 @@
           <a:p>
             <a:fld id="{552F244C-3785-4DB7-AC7B-A7EA222A042E}" type="slidenum">
               <a:rPr lang="de-CH" smtClean="0"/>
-              <a:t>‹Nr.›</a:t>
+              <a:t>‹#›</a:t>
             </a:fld>
             <a:endParaRPr lang="de-CH"/>
           </a:p>
@@ -576,7 +1228,7 @@
           <a:p>
             <a:fld id="{B4AEF157-6942-421D-9DEA-F58B3C8949A0}" type="datetimeFigureOut">
               <a:rPr lang="de-CH" smtClean="0"/>
-              <a:t>20.05.2019</a:t>
+              <a:t>21.05.2019</a:t>
             </a:fld>
             <a:endParaRPr lang="de-CH"/>
           </a:p>
@@ -618,7 +1270,7 @@
           <a:p>
             <a:fld id="{552F244C-3785-4DB7-AC7B-A7EA222A042E}" type="slidenum">
               <a:rPr lang="de-CH" smtClean="0"/>
-              <a:t>‹Nr.›</a:t>
+              <a:t>‹#›</a:t>
             </a:fld>
             <a:endParaRPr lang="de-CH"/>
           </a:p>
@@ -770,7 +1422,7 @@
           <a:p>
             <a:fld id="{B4AEF157-6942-421D-9DEA-F58B3C8949A0}" type="datetimeFigureOut">
               <a:rPr lang="de-CH" smtClean="0"/>
-              <a:t>20.05.2019</a:t>
+              <a:t>21.05.2019</a:t>
             </a:fld>
             <a:endParaRPr lang="de-CH"/>
           </a:p>
@@ -812,7 +1464,7 @@
           <a:p>
             <a:fld id="{552F244C-3785-4DB7-AC7B-A7EA222A042E}" type="slidenum">
               <a:rPr lang="de-CH" smtClean="0"/>
-              <a:t>‹Nr.›</a:t>
+              <a:t>‹#›</a:t>
             </a:fld>
             <a:endParaRPr lang="de-CH"/>
           </a:p>
@@ -1038,7 +1690,7 @@
           <a:p>
             <a:fld id="{B4AEF157-6942-421D-9DEA-F58B3C8949A0}" type="datetimeFigureOut">
               <a:rPr lang="de-CH" smtClean="0"/>
-              <a:t>20.05.2019</a:t>
+              <a:t>21.05.2019</a:t>
             </a:fld>
             <a:endParaRPr lang="de-CH"/>
           </a:p>
@@ -1080,7 +1732,7 @@
           <a:p>
             <a:fld id="{552F244C-3785-4DB7-AC7B-A7EA222A042E}" type="slidenum">
               <a:rPr lang="de-CH" smtClean="0"/>
-              <a:t>‹Nr.›</a:t>
+              <a:t>‹#›</a:t>
             </a:fld>
             <a:endParaRPr lang="de-CH"/>
           </a:p>
@@ -1370,7 +2022,7 @@
           <a:p>
             <a:fld id="{B4AEF157-6942-421D-9DEA-F58B3C8949A0}" type="datetimeFigureOut">
               <a:rPr lang="de-CH" smtClean="0"/>
-              <a:t>20.05.2019</a:t>
+              <a:t>21.05.2019</a:t>
             </a:fld>
             <a:endParaRPr lang="de-CH"/>
           </a:p>
@@ -1412,7 +2064,7 @@
           <a:p>
             <a:fld id="{552F244C-3785-4DB7-AC7B-A7EA222A042E}" type="slidenum">
               <a:rPr lang="de-CH" smtClean="0"/>
-              <a:t>‹Nr.›</a:t>
+              <a:t>‹#›</a:t>
             </a:fld>
             <a:endParaRPr lang="de-CH"/>
           </a:p>
@@ -1980,7 +2632,7 @@
           <a:p>
             <a:fld id="{B4AEF157-6942-421D-9DEA-F58B3C8949A0}" type="datetimeFigureOut">
               <a:rPr lang="de-CH" smtClean="0"/>
-              <a:t>20.05.2019</a:t>
+              <a:t>21.05.2019</a:t>
             </a:fld>
             <a:endParaRPr lang="de-CH"/>
           </a:p>
@@ -2022,7 +2674,7 @@
           <a:p>
             <a:fld id="{552F244C-3785-4DB7-AC7B-A7EA222A042E}" type="slidenum">
               <a:rPr lang="de-CH" smtClean="0"/>
-              <a:t>‹Nr.›</a:t>
+              <a:t>‹#›</a:t>
             </a:fld>
             <a:endParaRPr lang="de-CH"/>
           </a:p>
@@ -2827,7 +3479,7 @@
           <a:p>
             <a:fld id="{B4AEF157-6942-421D-9DEA-F58B3C8949A0}" type="datetimeFigureOut">
               <a:rPr lang="de-CH" smtClean="0"/>
-              <a:t>20.05.2019</a:t>
+              <a:t>21.05.2019</a:t>
             </a:fld>
             <a:endParaRPr lang="de-CH"/>
           </a:p>
@@ -2869,7 +3521,7 @@
           <a:p>
             <a:fld id="{552F244C-3785-4DB7-AC7B-A7EA222A042E}" type="slidenum">
               <a:rPr lang="de-CH" smtClean="0"/>
-              <a:t>‹Nr.›</a:t>
+              <a:t>‹#›</a:t>
             </a:fld>
             <a:endParaRPr lang="de-CH"/>
           </a:p>
@@ -2997,7 +3649,7 @@
           <a:p>
             <a:fld id="{B4AEF157-6942-421D-9DEA-F58B3C8949A0}" type="datetimeFigureOut">
               <a:rPr lang="de-CH" smtClean="0"/>
-              <a:t>20.05.2019</a:t>
+              <a:t>21.05.2019</a:t>
             </a:fld>
             <a:endParaRPr lang="de-CH"/>
           </a:p>
@@ -3039,7 +3691,7 @@
           <a:p>
             <a:fld id="{552F244C-3785-4DB7-AC7B-A7EA222A042E}" type="slidenum">
               <a:rPr lang="de-CH" smtClean="0"/>
-              <a:t>‹Nr.›</a:t>
+              <a:t>‹#›</a:t>
             </a:fld>
             <a:endParaRPr lang="de-CH"/>
           </a:p>
@@ -3177,7 +3829,7 @@
           <a:p>
             <a:fld id="{B4AEF157-6942-421D-9DEA-F58B3C8949A0}" type="datetimeFigureOut">
               <a:rPr lang="de-CH" smtClean="0"/>
-              <a:t>20.05.2019</a:t>
+              <a:t>21.05.2019</a:t>
             </a:fld>
             <a:endParaRPr lang="de-CH"/>
           </a:p>
@@ -3219,7 +3871,7 @@
           <a:p>
             <a:fld id="{552F244C-3785-4DB7-AC7B-A7EA222A042E}" type="slidenum">
               <a:rPr lang="de-CH" smtClean="0"/>
-              <a:t>‹Nr.›</a:t>
+              <a:t>‹#›</a:t>
             </a:fld>
             <a:endParaRPr lang="de-CH"/>
           </a:p>
@@ -3347,7 +3999,7 @@
           <a:p>
             <a:fld id="{B4AEF157-6942-421D-9DEA-F58B3C8949A0}" type="datetimeFigureOut">
               <a:rPr lang="de-CH" smtClean="0"/>
-              <a:t>20.05.2019</a:t>
+              <a:t>21.05.2019</a:t>
             </a:fld>
             <a:endParaRPr lang="de-CH"/>
           </a:p>
@@ -3389,7 +4041,7 @@
           <a:p>
             <a:fld id="{552F244C-3785-4DB7-AC7B-A7EA222A042E}" type="slidenum">
               <a:rPr lang="de-CH" smtClean="0"/>
-              <a:t>‹Nr.›</a:t>
+              <a:t>‹#›</a:t>
             </a:fld>
             <a:endParaRPr lang="de-CH"/>
           </a:p>
@@ -3591,7 +4243,7 @@
           <a:p>
             <a:fld id="{B4AEF157-6942-421D-9DEA-F58B3C8949A0}" type="datetimeFigureOut">
               <a:rPr lang="de-CH" smtClean="0"/>
-              <a:t>20.05.2019</a:t>
+              <a:t>21.05.2019</a:t>
             </a:fld>
             <a:endParaRPr lang="de-CH"/>
           </a:p>
@@ -3633,7 +4285,7 @@
           <a:p>
             <a:fld id="{552F244C-3785-4DB7-AC7B-A7EA222A042E}" type="slidenum">
               <a:rPr lang="de-CH" smtClean="0"/>
-              <a:t>‹Nr.›</a:t>
+              <a:t>‹#›</a:t>
             </a:fld>
             <a:endParaRPr lang="de-CH"/>
           </a:p>
@@ -3883,7 +4535,7 @@
           <a:p>
             <a:fld id="{B4AEF157-6942-421D-9DEA-F58B3C8949A0}" type="datetimeFigureOut">
               <a:rPr lang="de-CH" smtClean="0"/>
-              <a:t>20.05.2019</a:t>
+              <a:t>21.05.2019</a:t>
             </a:fld>
             <a:endParaRPr lang="de-CH"/>
           </a:p>
@@ -3925,7 +4577,7 @@
           <a:p>
             <a:fld id="{552F244C-3785-4DB7-AC7B-A7EA222A042E}" type="slidenum">
               <a:rPr lang="de-CH" smtClean="0"/>
-              <a:t>‹Nr.›</a:t>
+              <a:t>‹#›</a:t>
             </a:fld>
             <a:endParaRPr lang="de-CH"/>
           </a:p>
@@ -4321,7 +4973,7 @@
           <a:p>
             <a:fld id="{B4AEF157-6942-421D-9DEA-F58B3C8949A0}" type="datetimeFigureOut">
               <a:rPr lang="de-CH" smtClean="0"/>
-              <a:t>20.05.2019</a:t>
+              <a:t>21.05.2019</a:t>
             </a:fld>
             <a:endParaRPr lang="de-CH"/>
           </a:p>
@@ -4363,7 +5015,7 @@
           <a:p>
             <a:fld id="{552F244C-3785-4DB7-AC7B-A7EA222A042E}" type="slidenum">
               <a:rPr lang="de-CH" smtClean="0"/>
-              <a:t>‹Nr.›</a:t>
+              <a:t>‹#›</a:t>
             </a:fld>
             <a:endParaRPr lang="de-CH"/>
           </a:p>
@@ -4439,7 +5091,7 @@
           <a:p>
             <a:fld id="{B4AEF157-6942-421D-9DEA-F58B3C8949A0}" type="datetimeFigureOut">
               <a:rPr lang="de-CH" smtClean="0"/>
-              <a:t>20.05.2019</a:t>
+              <a:t>21.05.2019</a:t>
             </a:fld>
             <a:endParaRPr lang="de-CH"/>
           </a:p>
@@ -4481,7 +5133,7 @@
           <a:p>
             <a:fld id="{552F244C-3785-4DB7-AC7B-A7EA222A042E}" type="slidenum">
               <a:rPr lang="de-CH" smtClean="0"/>
-              <a:t>‹Nr.›</a:t>
+              <a:t>‹#›</a:t>
             </a:fld>
             <a:endParaRPr lang="de-CH"/>
           </a:p>
@@ -4534,7 +5186,7 @@
           <a:p>
             <a:fld id="{B4AEF157-6942-421D-9DEA-F58B3C8949A0}" type="datetimeFigureOut">
               <a:rPr lang="de-CH" smtClean="0"/>
-              <a:t>20.05.2019</a:t>
+              <a:t>21.05.2019</a:t>
             </a:fld>
             <a:endParaRPr lang="de-CH"/>
           </a:p>
@@ -4576,7 +5228,7 @@
           <a:p>
             <a:fld id="{552F244C-3785-4DB7-AC7B-A7EA222A042E}" type="slidenum">
               <a:rPr lang="de-CH" smtClean="0"/>
-              <a:t>‹Nr.›</a:t>
+              <a:t>‹#›</a:t>
             </a:fld>
             <a:endParaRPr lang="de-CH"/>
           </a:p>
@@ -4813,7 +5465,7 @@
           <a:p>
             <a:fld id="{B4AEF157-6942-421D-9DEA-F58B3C8949A0}" type="datetimeFigureOut">
               <a:rPr lang="de-CH" smtClean="0"/>
-              <a:t>20.05.2019</a:t>
+              <a:t>21.05.2019</a:t>
             </a:fld>
             <a:endParaRPr lang="de-CH"/>
           </a:p>
@@ -4855,7 +5507,7 @@
           <a:p>
             <a:fld id="{552F244C-3785-4DB7-AC7B-A7EA222A042E}" type="slidenum">
               <a:rPr lang="de-CH" smtClean="0"/>
-              <a:t>‹Nr.›</a:t>
+              <a:t>‹#›</a:t>
             </a:fld>
             <a:endParaRPr lang="de-CH"/>
           </a:p>
@@ -5088,7 +5740,7 @@
           <a:p>
             <a:fld id="{B4AEF157-6942-421D-9DEA-F58B3C8949A0}" type="datetimeFigureOut">
               <a:rPr lang="de-CH" smtClean="0"/>
-              <a:t>20.05.2019</a:t>
+              <a:t>21.05.2019</a:t>
             </a:fld>
             <a:endParaRPr lang="de-CH"/>
           </a:p>
@@ -5130,7 +5782,7 @@
           <a:p>
             <a:fld id="{552F244C-3785-4DB7-AC7B-A7EA222A042E}" type="slidenum">
               <a:rPr lang="de-CH" smtClean="0"/>
-              <a:t>‹Nr.›</a:t>
+              <a:t>‹#›</a:t>
             </a:fld>
             <a:endParaRPr lang="de-CH"/>
           </a:p>
@@ -5517,7 +6169,7 @@
           <a:p>
             <a:fld id="{B4AEF157-6942-421D-9DEA-F58B3C8949A0}" type="datetimeFigureOut">
               <a:rPr lang="de-CH" smtClean="0"/>
-              <a:t>20.05.2019</a:t>
+              <a:t>21.05.2019</a:t>
             </a:fld>
             <a:endParaRPr lang="de-CH"/>
           </a:p>
@@ -5596,7 +6248,7 @@
           <a:p>
             <a:fld id="{552F244C-3785-4DB7-AC7B-A7EA222A042E}" type="slidenum">
               <a:rPr lang="de-CH" smtClean="0"/>
-              <a:t>‹Nr.›</a:t>
+              <a:t>‹#›</a:t>
             </a:fld>
             <a:endParaRPr lang="de-CH"/>
           </a:p>
@@ -6041,7 +6693,7 @@
           <a:p>
             <a:r>
               <a:rPr lang="de-CH" dirty="0"/>
-              <a:t>Web </a:t>
+              <a:t>Analyse von CMS Security mit Web </a:t>
             </a:r>
             <a:r>
               <a:rPr lang="de-CH" dirty="0" err="1"/>
@@ -6128,7 +6780,7 @@
           <p:cNvPr id="2" name="Titel 1">
             <a:extLst>
               <a:ext uri="{FF2B5EF4-FFF2-40B4-BE49-F238E27FC236}">
-                <a16:creationId xmlns:a16="http://schemas.microsoft.com/office/drawing/2014/main" id="{21F79AFF-442F-44D7-BBD0-D2310912627B}"/>
+                <a16:creationId xmlns:a16="http://schemas.microsoft.com/office/drawing/2014/main" id="{83315E7B-D1C0-440F-AA83-3D601ACE6C79}"/>
               </a:ext>
             </a:extLst>
           </p:cNvPr>
@@ -6145,8 +6797,12 @@
           <a:lstStyle/>
           <a:p>
             <a:r>
+              <a:rPr lang="de-CH" dirty="0" err="1"/>
+              <a:t>Wordpress</a:t>
+            </a:r>
+            <a:r>
               <a:rPr lang="de-CH" dirty="0"/>
-              <a:t>Wie kann man Sicherheitsrisiken minimieren?</a:t>
+              <a:t> Login Sicherheit</a:t>
             </a:r>
           </a:p>
         </p:txBody>
@@ -6156,7 +6812,7 @@
           <p:cNvPr id="3" name="Inhaltsplatzhalter 2">
             <a:extLst>
               <a:ext uri="{FF2B5EF4-FFF2-40B4-BE49-F238E27FC236}">
-                <a16:creationId xmlns:a16="http://schemas.microsoft.com/office/drawing/2014/main" id="{77BA0EA5-45BA-485D-864A-B70402EC5515}"/>
+                <a16:creationId xmlns:a16="http://schemas.microsoft.com/office/drawing/2014/main" id="{F1572EFE-6B69-4083-9AC8-82D91C863DD5}"/>
               </a:ext>
             </a:extLst>
           </p:cNvPr>
@@ -6169,37 +6825,102 @@
         </p:nvSpPr>
         <p:spPr/>
         <p:txBody>
-          <a:bodyPr>
-            <a:normAutofit/>
-          </a:bodyPr>
-          <a:lstStyle/>
-          <a:p>
-            <a:r>
-              <a:rPr lang="de-CH" sz="2400" dirty="0"/>
-              <a:t>Robots.txt und HTML Meta-tags helfen nicht</a:t>
-            </a:r>
-          </a:p>
-          <a:p>
-            <a:r>
-              <a:rPr lang="de-CH" sz="2400" dirty="0"/>
-              <a:t>Erhöhtes Sicherheitsrisiko, da so Angreifern gesagt wird was sie nicht tuen sollen.</a:t>
-            </a:r>
-          </a:p>
-          <a:p>
-            <a:endParaRPr lang="de-CH" sz="2400" dirty="0"/>
-          </a:p>
-          <a:p>
-            <a:r>
-              <a:rPr lang="de-CH" sz="2400" dirty="0"/>
-              <a:t>Besser: Authentifizierung um zu verhindern das Unbefugte Teile der Website abrufen können </a:t>
-            </a:r>
+          <a:bodyPr/>
+          <a:lstStyle/>
+          <a:p>
+            <a:r>
+              <a:rPr lang="de-CH" dirty="0">
+                <a:solidFill>
+                  <a:srgbClr val="FF0000"/>
+                </a:solidFill>
+              </a:rPr>
+              <a:t>Verstecken ihre Admin </a:t>
+            </a:r>
+            <a:r>
+              <a:rPr lang="de-CH" dirty="0" err="1">
+                <a:solidFill>
+                  <a:srgbClr val="FF0000"/>
+                </a:solidFill>
+              </a:rPr>
+              <a:t>Loginpage</a:t>
+            </a:r>
+            <a:r>
+              <a:rPr lang="de-CH" dirty="0">
+                <a:solidFill>
+                  <a:srgbClr val="FF0000"/>
+                </a:solidFill>
+              </a:rPr>
+              <a:t>:</a:t>
+            </a:r>
+          </a:p>
+          <a:p>
+            <a:r>
+              <a:rPr lang="de-CH" dirty="0">
+                <a:solidFill>
+                  <a:srgbClr val="FF0000"/>
+                </a:solidFill>
+              </a:rPr>
+              <a:t>Verstecken Ihre Admin </a:t>
+            </a:r>
+            <a:r>
+              <a:rPr lang="de-CH" dirty="0" err="1">
+                <a:solidFill>
+                  <a:srgbClr val="FF0000"/>
+                </a:solidFill>
+              </a:rPr>
+              <a:t>Loginpage</a:t>
+            </a:r>
+            <a:r>
+              <a:rPr lang="de-CH" dirty="0">
+                <a:solidFill>
+                  <a:srgbClr val="FF0000"/>
+                </a:solidFill>
+              </a:rPr>
+              <a:t> nicht:</a:t>
+            </a:r>
+          </a:p>
+          <a:p>
+            <a:r>
+              <a:rPr lang="de-CH" dirty="0">
+                <a:solidFill>
+                  <a:srgbClr val="FF0000"/>
+                </a:solidFill>
+              </a:rPr>
+              <a:t>Haben zusätzliche Login Security </a:t>
+            </a:r>
+            <a:r>
+              <a:rPr lang="de-CH" dirty="0" err="1">
+                <a:solidFill>
+                  <a:srgbClr val="FF0000"/>
+                </a:solidFill>
+              </a:rPr>
+              <a:t>measures</a:t>
+            </a:r>
+            <a:r>
+              <a:rPr lang="de-CH" dirty="0">
+                <a:solidFill>
+                  <a:srgbClr val="FF0000"/>
+                </a:solidFill>
+              </a:rPr>
+              <a:t>:</a:t>
+            </a:r>
+          </a:p>
+          <a:p>
+            <a:endParaRPr lang="de-CH" dirty="0">
+              <a:solidFill>
+                <a:srgbClr val="FF0000"/>
+              </a:solidFill>
+            </a:endParaRPr>
+          </a:p>
+          <a:p>
+            <a:endParaRPr lang="de-CH" dirty="0"/>
           </a:p>
         </p:txBody>
       </p:sp>
     </p:spTree>
     <p:extLst>
       <p:ext uri="{BB962C8B-B14F-4D97-AF65-F5344CB8AC3E}">
-        <p14:creationId xmlns:p14="http://schemas.microsoft.com/office/powerpoint/2010/main" val="2890981895"/>
+        <p14:creationId xmlns:p14="http://schemas.microsoft.com/office/powerpoint/2010/main" val="107645751"/>
       </p:ext>
     </p:extLst>
   </p:cSld>
@@ -6228,10 +6949,10 @@
       </p:grpSpPr>
       <p:sp>
         <p:nvSpPr>
-          <p:cNvPr id="2" name="Titel 1">
+          <p:cNvPr id="2" name="Title 1">
             <a:extLst>
               <a:ext uri="{FF2B5EF4-FFF2-40B4-BE49-F238E27FC236}">
-                <a16:creationId xmlns:a16="http://schemas.microsoft.com/office/drawing/2014/main" id="{83315E7B-D1C0-440F-AA83-3D601ACE6C79}"/>
+                <a16:creationId xmlns:a16="http://schemas.microsoft.com/office/drawing/2014/main" id="{C94F9107-AA21-4F5B-BCAD-96BD4C66F5BE}"/>
               </a:ext>
             </a:extLst>
           </p:cNvPr>
@@ -6248,22 +6969,19 @@
           <a:lstStyle/>
           <a:p>
             <a:r>
-              <a:rPr lang="de-CH" dirty="0" err="1"/>
-              <a:t>Wordpress</a:t>
-            </a:r>
-            <a:r>
-              <a:rPr lang="de-CH" dirty="0"/>
-              <a:t> Login Sicherheit</a:t>
-            </a:r>
-          </a:p>
-        </p:txBody>
-      </p:sp>
-      <p:sp>
-        <p:nvSpPr>
-          <p:cNvPr id="3" name="Inhaltsplatzhalter 2">
+              <a:rPr lang="de-DE" dirty="0"/>
+              <a:t>Robots.txt</a:t>
+            </a:r>
+            <a:endParaRPr lang="en-US" dirty="0"/>
+          </a:p>
+        </p:txBody>
+      </p:sp>
+      <p:sp>
+        <p:nvSpPr>
+          <p:cNvPr id="3" name="Content Placeholder 2">
             <a:extLst>
               <a:ext uri="{FF2B5EF4-FFF2-40B4-BE49-F238E27FC236}">
-                <a16:creationId xmlns:a16="http://schemas.microsoft.com/office/drawing/2014/main" id="{F1572EFE-6B69-4083-9AC8-82D91C863DD5}"/>
+                <a16:creationId xmlns:a16="http://schemas.microsoft.com/office/drawing/2014/main" id="{6F8BDCBC-7E6A-4E72-85A8-FA7D144D4179}"/>
               </a:ext>
             </a:extLst>
           </p:cNvPr>
@@ -6276,27 +6994,263 @@
         </p:nvSpPr>
         <p:spPr/>
         <p:txBody>
-          <a:bodyPr/>
-          <a:lstStyle/>
-          <a:p>
-            <a:r>
-              <a:rPr lang="de-CH" dirty="0">
-                <a:solidFill>
-                  <a:srgbClr val="FF0000"/>
-                </a:solidFill>
-              </a:rPr>
-              <a:t>Statistik hier</a:t>
-            </a:r>
-          </a:p>
-          <a:p>
-            <a:endParaRPr lang="de-CH" dirty="0"/>
+          <a:bodyPr>
+            <a:normAutofit fontScale="92500" lnSpcReduction="10000"/>
+          </a:bodyPr>
+          <a:lstStyle/>
+          <a:p>
+            <a:r>
+              <a:rPr lang="en-US" i="1" dirty="0"/>
+              <a:t>File das Web </a:t>
+            </a:r>
+            <a:r>
+              <a:rPr lang="en-US" i="1" dirty="0" err="1"/>
+              <a:t>Crawlern</a:t>
+            </a:r>
+            <a:r>
+              <a:rPr lang="en-US" i="1" dirty="0"/>
+              <a:t> </a:t>
+            </a:r>
+            <a:r>
+              <a:rPr lang="en-US" i="1" dirty="0" err="1"/>
+              <a:t>angiebt</a:t>
+            </a:r>
+            <a:r>
+              <a:rPr lang="en-US" i="1" dirty="0"/>
+              <a:t> was/was </a:t>
+            </a:r>
+            <a:r>
+              <a:rPr lang="en-US" i="1" dirty="0" err="1"/>
+              <a:t>nicht</a:t>
+            </a:r>
+            <a:r>
+              <a:rPr lang="en-US" i="1" dirty="0"/>
+              <a:t> </a:t>
+            </a:r>
+            <a:r>
+              <a:rPr lang="en-US" i="1" dirty="0" err="1"/>
+              <a:t>sie</a:t>
+            </a:r>
+            <a:r>
+              <a:rPr lang="en-US" i="1" dirty="0"/>
+              <a:t> </a:t>
+            </a:r>
+            <a:r>
+              <a:rPr lang="en-US" i="1" dirty="0" err="1"/>
+              <a:t>crawlen</a:t>
+            </a:r>
+            <a:r>
+              <a:rPr lang="en-US" i="1" dirty="0"/>
+              <a:t> </a:t>
+            </a:r>
+            <a:r>
+              <a:rPr lang="en-US" i="1" dirty="0" err="1"/>
+              <a:t>sollen</a:t>
+            </a:r>
+            <a:r>
+              <a:rPr lang="en-US" i="1" dirty="0"/>
+              <a:t>.</a:t>
+            </a:r>
+          </a:p>
+          <a:p>
+            <a:r>
+              <a:rPr lang="en-US" i="1" dirty="0" err="1"/>
+              <a:t>Beispiel</a:t>
+            </a:r>
+            <a:r>
+              <a:rPr lang="en-US" i="1" dirty="0"/>
+              <a:t> 1 (</a:t>
+            </a:r>
+            <a:r>
+              <a:rPr lang="en-US" i="1" dirty="0" err="1"/>
+              <a:t>alle</a:t>
+            </a:r>
+            <a:r>
+              <a:rPr lang="en-US" i="1" dirty="0"/>
+              <a:t> crawler </a:t>
+            </a:r>
+            <a:r>
+              <a:rPr lang="en-US" i="1" dirty="0" err="1"/>
+              <a:t>dürfen</a:t>
+            </a:r>
+            <a:r>
+              <a:rPr lang="en-US" i="1" dirty="0"/>
+              <a:t> </a:t>
+            </a:r>
+            <a:r>
+              <a:rPr lang="en-US" i="1" dirty="0" err="1"/>
+              <a:t>alles</a:t>
+            </a:r>
+            <a:r>
+              <a:rPr lang="en-US" i="1" dirty="0"/>
+              <a:t> </a:t>
+            </a:r>
+            <a:r>
+              <a:rPr lang="en-US" i="1" dirty="0" err="1"/>
+              <a:t>crawlen</a:t>
+            </a:r>
+            <a:r>
+              <a:rPr lang="en-US" i="1" dirty="0"/>
+              <a:t>):</a:t>
+            </a:r>
+          </a:p>
+          <a:p>
+            <a:pPr lvl="1"/>
+            <a:r>
+              <a:rPr lang="en-US" i="1" dirty="0"/>
+              <a:t>User-agent: *</a:t>
+            </a:r>
+            <a:br>
+              <a:rPr lang="en-US" i="1" dirty="0"/>
+            </a:br>
+            <a:r>
+              <a:rPr lang="en-US" i="1" dirty="0"/>
+              <a:t>Disallow:</a:t>
+            </a:r>
+          </a:p>
+          <a:p>
+            <a:r>
+              <a:rPr lang="en-US" i="1" dirty="0" err="1"/>
+              <a:t>Beispiel</a:t>
+            </a:r>
+            <a:r>
+              <a:rPr lang="en-US" i="1" dirty="0"/>
+              <a:t> 2 (</a:t>
+            </a:r>
+            <a:r>
+              <a:rPr lang="en-US" i="1" dirty="0" err="1"/>
+              <a:t>alle</a:t>
+            </a:r>
+            <a:r>
+              <a:rPr lang="en-US" i="1" dirty="0"/>
+              <a:t> crawler </a:t>
+            </a:r>
+            <a:r>
+              <a:rPr lang="en-US" i="1" dirty="0" err="1"/>
+              <a:t>dürfen</a:t>
+            </a:r>
+            <a:r>
+              <a:rPr lang="en-US" i="1" dirty="0"/>
+              <a:t> gar </a:t>
+            </a:r>
+            <a:r>
+              <a:rPr lang="en-US" i="1" dirty="0" err="1"/>
+              <a:t>nichts</a:t>
+            </a:r>
+            <a:r>
+              <a:rPr lang="en-US" i="1" dirty="0"/>
+              <a:t> </a:t>
+            </a:r>
+            <a:r>
+              <a:rPr lang="en-US" i="1" dirty="0" err="1"/>
+              <a:t>crawlen</a:t>
+            </a:r>
+            <a:r>
+              <a:rPr lang="en-US" i="1" dirty="0"/>
+              <a:t>):</a:t>
+            </a:r>
+          </a:p>
+          <a:p>
+            <a:pPr lvl="1"/>
+            <a:r>
+              <a:rPr lang="en-US" i="1" dirty="0"/>
+              <a:t>User-agent: *</a:t>
+            </a:r>
+            <a:br>
+              <a:rPr lang="en-US" i="1" dirty="0"/>
+            </a:br>
+            <a:r>
+              <a:rPr lang="en-US" i="1" dirty="0"/>
+              <a:t>Disallow: /</a:t>
+            </a:r>
+          </a:p>
+          <a:p>
+            <a:r>
+              <a:rPr lang="en-US" i="1" dirty="0" err="1"/>
+              <a:t>Beispiel</a:t>
+            </a:r>
+            <a:r>
+              <a:rPr lang="en-US" i="1" dirty="0"/>
+              <a:t> 3 (</a:t>
+            </a:r>
+            <a:r>
+              <a:rPr lang="en-US" i="1" dirty="0" err="1"/>
+              <a:t>alle</a:t>
+            </a:r>
+            <a:r>
+              <a:rPr lang="en-US" i="1" dirty="0"/>
+              <a:t> crawler </a:t>
+            </a:r>
+            <a:r>
+              <a:rPr lang="en-US" i="1" dirty="0" err="1"/>
+              <a:t>dürfen</a:t>
+            </a:r>
+            <a:r>
+              <a:rPr lang="en-US" i="1" dirty="0"/>
+              <a:t> </a:t>
+            </a:r>
+            <a:r>
+              <a:rPr lang="en-US" i="1" dirty="0" err="1"/>
+              <a:t>alles</a:t>
+            </a:r>
+            <a:r>
+              <a:rPr lang="en-US" i="1" dirty="0"/>
+              <a:t> </a:t>
+            </a:r>
+            <a:r>
+              <a:rPr lang="en-US" i="1" dirty="0" err="1"/>
+              <a:t>ausser</a:t>
+            </a:r>
+            <a:r>
+              <a:rPr lang="en-US" i="1" dirty="0"/>
+              <a:t> /private und /security </a:t>
+            </a:r>
+            <a:r>
+              <a:rPr lang="en-US" i="1" dirty="0" err="1"/>
+              <a:t>crawlen</a:t>
+            </a:r>
+            <a:r>
+              <a:rPr lang="en-US" i="1" dirty="0"/>
+              <a:t>):</a:t>
+            </a:r>
+          </a:p>
+          <a:p>
+            <a:pPr lvl="1"/>
+            <a:r>
+              <a:rPr lang="en-US" i="1" dirty="0"/>
+              <a:t>User-agent: *</a:t>
+            </a:r>
+            <a:br>
+              <a:rPr lang="en-US" i="1" dirty="0"/>
+            </a:br>
+            <a:r>
+              <a:rPr lang="en-US" i="1" dirty="0"/>
+              <a:t>Disallow: /private</a:t>
+            </a:r>
+            <a:br>
+              <a:rPr lang="en-US" i="1" dirty="0"/>
+            </a:br>
+            <a:r>
+              <a:rPr lang="en-US" i="1" dirty="0"/>
+              <a:t>Disallow: /security</a:t>
+            </a:r>
+          </a:p>
+          <a:p>
+            <a:r>
+              <a:rPr lang="de-CH" dirty="0" err="1"/>
+              <a:t>Webcrawler</a:t>
+            </a:r>
+            <a:r>
+              <a:rPr lang="de-CH" dirty="0"/>
+              <a:t> müssen sich nicht daran halten (rechtlich irrelevant)</a:t>
+            </a:r>
           </a:p>
         </p:txBody>
       </p:sp>
     </p:spTree>
     <p:extLst>
       <p:ext uri="{BB962C8B-B14F-4D97-AF65-F5344CB8AC3E}">
-        <p14:creationId xmlns:p14="http://schemas.microsoft.com/office/powerpoint/2010/main" val="107645751"/>
+        <p14:creationId xmlns:p14="http://schemas.microsoft.com/office/powerpoint/2010/main" val="1697646668"/>
       </p:ext>
     </p:extLst>
   </p:cSld>
@@ -6307,6 +7261,117 @@
 </file>
 
 <file path=ppt/slides/slide12.xml><?xml version="1.0" encoding="utf-8"?>
+<p:sld xmlns:a="http://schemas.openxmlformats.org/drawingml/2006/main" xmlns:r="http://schemas.openxmlformats.org/officeDocument/2006/relationships" xmlns:p="http://schemas.openxmlformats.org/presentationml/2006/main">
+  <p:cSld>
+    <p:spTree>
+      <p:nvGrpSpPr>
+        <p:cNvPr id="1" name=""/>
+        <p:cNvGrpSpPr/>
+        <p:nvPr/>
+      </p:nvGrpSpPr>
+      <p:grpSpPr>
+        <a:xfrm>
+          <a:off x="0" y="0"/>
+          <a:ext cx="0" cy="0"/>
+          <a:chOff x="0" y="0"/>
+          <a:chExt cx="0" cy="0"/>
+        </a:xfrm>
+      </p:grpSpPr>
+      <p:sp>
+        <p:nvSpPr>
+          <p:cNvPr id="2" name="Titel 1">
+            <a:extLst>
+              <a:ext uri="{FF2B5EF4-FFF2-40B4-BE49-F238E27FC236}">
+                <a16:creationId xmlns:a16="http://schemas.microsoft.com/office/drawing/2014/main" id="{21F79AFF-442F-44D7-BBD0-D2310912627B}"/>
+              </a:ext>
+            </a:extLst>
+          </p:cNvPr>
+          <p:cNvSpPr>
+            <a:spLocks noGrp="1"/>
+          </p:cNvSpPr>
+          <p:nvPr>
+            <p:ph type="title"/>
+          </p:nvPr>
+        </p:nvSpPr>
+        <p:spPr/>
+        <p:txBody>
+          <a:bodyPr/>
+          <a:lstStyle/>
+          <a:p>
+            <a:r>
+              <a:rPr lang="de-CH" dirty="0"/>
+              <a:t>Wie kann man Sicherheitsrisiken minimieren?</a:t>
+            </a:r>
+          </a:p>
+        </p:txBody>
+      </p:sp>
+      <p:sp>
+        <p:nvSpPr>
+          <p:cNvPr id="3" name="Inhaltsplatzhalter 2">
+            <a:extLst>
+              <a:ext uri="{FF2B5EF4-FFF2-40B4-BE49-F238E27FC236}">
+                <a16:creationId xmlns:a16="http://schemas.microsoft.com/office/drawing/2014/main" id="{77BA0EA5-45BA-485D-864A-B70402EC5515}"/>
+              </a:ext>
+            </a:extLst>
+          </p:cNvPr>
+          <p:cNvSpPr>
+            <a:spLocks noGrp="1"/>
+          </p:cNvSpPr>
+          <p:nvPr>
+            <p:ph idx="1"/>
+          </p:nvPr>
+        </p:nvSpPr>
+        <p:spPr/>
+        <p:txBody>
+          <a:bodyPr>
+            <a:normAutofit/>
+          </a:bodyPr>
+          <a:lstStyle/>
+          <a:p>
+            <a:r>
+              <a:rPr lang="de-CH" sz="2400" dirty="0"/>
+              <a:t>Robots.txt und HTML Meta-tags helfen nicht</a:t>
+            </a:r>
+          </a:p>
+          <a:p>
+            <a:r>
+              <a:rPr lang="de-CH" sz="2400" dirty="0"/>
+              <a:t>Erhöhtes Sicherheitsrisiko, da so Angreifern gesagt wird was sie nicht tuen sollen.</a:t>
+            </a:r>
+          </a:p>
+          <a:p>
+            <a:endParaRPr lang="de-CH" sz="2400" dirty="0"/>
+          </a:p>
+          <a:p>
+            <a:r>
+              <a:rPr lang="de-CH" sz="2400" dirty="0"/>
+              <a:t>Besser: Authentifizierung um zu verhindern das Unbefugte Teile der Website abrufen können, starkes Passwort,  Admin </a:t>
+            </a:r>
+            <a:r>
+              <a:rPr lang="de-CH" sz="2400" dirty="0" err="1"/>
+              <a:t>login</a:t>
+            </a:r>
+            <a:r>
+              <a:rPr lang="de-CH" sz="2400" dirty="0"/>
+              <a:t> verstecken, CMS/Plugins immer updaten, </a:t>
+            </a:r>
+          </a:p>
+        </p:txBody>
+      </p:sp>
+    </p:spTree>
+    <p:extLst>
+      <p:ext uri="{BB962C8B-B14F-4D97-AF65-F5344CB8AC3E}">
+        <p14:creationId xmlns:p14="http://schemas.microsoft.com/office/powerpoint/2010/main" val="2890981895"/>
+      </p:ext>
+    </p:extLst>
+  </p:cSld>
+  <p:clrMapOvr>
+    <a:masterClrMapping/>
+  </p:clrMapOvr>
+</p:sld>
+</file>
+
+<file path=ppt/slides/slide13.xml><?xml version="1.0" encoding="utf-8"?>
 <p:sld xmlns:a="http://schemas.openxmlformats.org/drawingml/2006/main" xmlns:r="http://schemas.openxmlformats.org/officeDocument/2006/relationships" xmlns:p="http://schemas.openxmlformats.org/presentationml/2006/main">
   <p:cSld>
     <p:spTree>
@@ -6392,7 +7457,7 @@
           <p:cNvPr id="2" name="Titel 1">
             <a:extLst>
               <a:ext uri="{FF2B5EF4-FFF2-40B4-BE49-F238E27FC236}">
-                <a16:creationId xmlns:a16="http://schemas.microsoft.com/office/drawing/2014/main" id="{75095E51-B084-4B57-8352-590844DE72EF}"/>
+                <a16:creationId xmlns:a16="http://schemas.microsoft.com/office/drawing/2014/main" id="{DCA0B1A3-EF42-4D47-84A0-F83C71322160}"/>
               </a:ext>
             </a:extLst>
           </p:cNvPr>
@@ -6410,7 +7475,7 @@
           <a:p>
             <a:r>
               <a:rPr lang="de-CH" dirty="0"/>
-              <a:t>Webcrawler</a:t>
+              <a:t>CMS</a:t>
             </a:r>
           </a:p>
         </p:txBody>
@@ -6420,7 +7485,7 @@
           <p:cNvPr id="3" name="Inhaltsplatzhalter 2">
             <a:extLst>
               <a:ext uri="{FF2B5EF4-FFF2-40B4-BE49-F238E27FC236}">
-                <a16:creationId xmlns:a16="http://schemas.microsoft.com/office/drawing/2014/main" id="{B8F1EC26-8C22-47D3-ACC9-101B2629A8DD}"/>
+                <a16:creationId xmlns:a16="http://schemas.microsoft.com/office/drawing/2014/main" id="{9440D8B8-64F4-4E20-BF60-21675D5F48A3}"/>
               </a:ext>
             </a:extLst>
           </p:cNvPr>
@@ -6431,80 +7496,87 @@
             <p:ph idx="1"/>
           </p:nvPr>
         </p:nvSpPr>
-        <p:spPr/>
-        <p:txBody>
-          <a:bodyPr/>
-          <a:lstStyle/>
-          <a:p>
-            <a:pPr marL="457200" indent="-457200">
-              <a:buFont typeface="+mj-lt"/>
-              <a:buAutoNum type="arabicPeriod"/>
+        <p:spPr>
+          <a:xfrm>
+            <a:off x="500197" y="1900440"/>
+            <a:ext cx="4986203" cy="4195481"/>
+          </a:xfrm>
+        </p:spPr>
+        <p:txBody>
+          <a:bodyPr>
+            <a:normAutofit/>
+          </a:bodyPr>
+          <a:lstStyle/>
+          <a:p>
+            <a:pPr marL="0" indent="0">
+              <a:buNone/>
             </a:pPr>
             <a:r>
-              <a:rPr lang="de-CH" sz="2400" dirty="0"/>
-              <a:t>Startet bei einer URL</a:t>
-            </a:r>
-          </a:p>
-          <a:p>
-            <a:pPr marL="457200" indent="-457200">
-              <a:buFont typeface="+mj-lt"/>
-              <a:buAutoNum type="arabicPeriod"/>
-            </a:pPr>
-            <a:r>
-              <a:rPr lang="de-CH" sz="2400" dirty="0"/>
-              <a:t>Scannt Website auf Hyperlinks und speichert Daten</a:t>
-            </a:r>
-          </a:p>
-          <a:p>
-            <a:pPr marL="457200" indent="-457200">
-              <a:buFont typeface="+mj-lt"/>
-              <a:buAutoNum type="arabicPeriod"/>
-            </a:pPr>
-            <a:r>
-              <a:rPr lang="de-CH" sz="2400" dirty="0"/>
-              <a:t>Hyperlinks werden Queue hinzugefügt</a:t>
-            </a:r>
-          </a:p>
-          <a:p>
-            <a:pPr marL="457200" indent="-457200">
-              <a:buFont typeface="+mj-lt"/>
-              <a:buAutoNum type="arabicPeriod"/>
-            </a:pPr>
-            <a:r>
-              <a:rPr lang="de-CH" sz="2400" dirty="0"/>
-              <a:t>Scannt nächste Website in der Queue und speichert Daten</a:t>
-            </a:r>
-          </a:p>
-          <a:p>
-            <a:pPr marL="457200" indent="-457200">
-              <a:buFont typeface="+mj-lt"/>
-              <a:buAutoNum type="arabicPeriod"/>
-            </a:pPr>
-            <a:r>
-              <a:rPr lang="de-CH" sz="2400" dirty="0"/>
-              <a:t>Usw.</a:t>
-            </a:r>
-          </a:p>
-          <a:p>
-            <a:pPr marL="457200" indent="-457200">
-              <a:buFont typeface="+mj-lt"/>
-              <a:buAutoNum type="arabicPeriod"/>
-            </a:pPr>
-            <a:endParaRPr lang="de-CH" dirty="0"/>
-          </a:p>
-          <a:p>
-            <a:pPr marL="457200" indent="-457200">
-              <a:buFont typeface="+mj-lt"/>
-              <a:buAutoNum type="arabicPeriod"/>
-            </a:pPr>
-            <a:endParaRPr lang="de-CH" dirty="0"/>
-          </a:p>
-        </p:txBody>
-      </p:sp>
+              <a:rPr lang="de-CH" sz="3600" dirty="0">
+                <a:solidFill>
+                  <a:srgbClr val="FF0000"/>
+                </a:solidFill>
+              </a:rPr>
+              <a:t>«</a:t>
+            </a:r>
+            <a:r>
+              <a:rPr lang="en-US" sz="2800" dirty="0"/>
+              <a:t>A Content Management System (CMS) is an application through which you can easily create and manage dynamic web content</a:t>
+            </a:r>
+            <a:r>
+              <a:rPr lang="de-CH" sz="3600" dirty="0">
+                <a:solidFill>
+                  <a:srgbClr val="FF0000"/>
+                </a:solidFill>
+              </a:rPr>
+              <a:t>» </a:t>
+            </a:r>
+            <a:r>
+              <a:rPr lang="en-US" sz="1600" dirty="0"/>
+              <a:t>(Source: siteground.com)</a:t>
+            </a:r>
+            <a:endParaRPr lang="en-US" sz="3600" dirty="0">
+              <a:solidFill>
+                <a:srgbClr val="FF0000"/>
+              </a:solidFill>
+            </a:endParaRPr>
+          </a:p>
+        </p:txBody>
+      </p:sp>
+      <p:pic>
+        <p:nvPicPr>
+          <p:cNvPr id="4" name="Picture 3">
+            <a:extLst>
+              <a:ext uri="{FF2B5EF4-FFF2-40B4-BE49-F238E27FC236}">
+                <a16:creationId xmlns:a16="http://schemas.microsoft.com/office/drawing/2014/main" id="{EA4FC959-E86F-4B44-B97B-0A8112B546CC}"/>
+              </a:ext>
+            </a:extLst>
+          </p:cNvPr>
+          <p:cNvPicPr>
+            <a:picLocks noChangeAspect="1"/>
+          </p:cNvPicPr>
+          <p:nvPr/>
+        </p:nvPicPr>
+        <p:blipFill>
+          <a:blip r:embed="rId3"/>
+          <a:stretch>
+            <a:fillRect/>
+          </a:stretch>
+        </p:blipFill>
+        <p:spPr>
+          <a:xfrm>
+            <a:off x="5486400" y="1355691"/>
+            <a:ext cx="6191250" cy="4600575"/>
+          </a:xfrm>
+          <a:prstGeom prst="rect">
+            <a:avLst/>
+          </a:prstGeom>
+        </p:spPr>
+      </p:pic>
     </p:spTree>
     <p:extLst>
       <p:ext uri="{BB962C8B-B14F-4D97-AF65-F5344CB8AC3E}">
-        <p14:creationId xmlns:p14="http://schemas.microsoft.com/office/powerpoint/2010/main" val="2131925419"/>
+        <p14:creationId xmlns:p14="http://schemas.microsoft.com/office/powerpoint/2010/main" val="123932608"/>
       </p:ext>
     </p:extLst>
   </p:cSld>
@@ -6533,10 +7605,10 @@
       </p:grpSpPr>
       <p:sp>
         <p:nvSpPr>
-          <p:cNvPr id="2" name="Titel 1">
+          <p:cNvPr id="2" name="Title 1">
             <a:extLst>
               <a:ext uri="{FF2B5EF4-FFF2-40B4-BE49-F238E27FC236}">
-                <a16:creationId xmlns:a16="http://schemas.microsoft.com/office/drawing/2014/main" id="{9C33D687-DB4A-442E-9E78-D62ED519CB39}"/>
+                <a16:creationId xmlns:a16="http://schemas.microsoft.com/office/drawing/2014/main" id="{C3140AFD-C3EF-49EF-BED3-490D468F6676}"/>
               </a:ext>
             </a:extLst>
           </p:cNvPr>
@@ -6554,17 +7626,18 @@
           <a:p>
             <a:r>
               <a:rPr lang="de-CH" dirty="0"/>
-              <a:t>Webcrawler ausschliessen</a:t>
-            </a:r>
-          </a:p>
-        </p:txBody>
-      </p:sp>
-      <p:sp>
-        <p:nvSpPr>
-          <p:cNvPr id="3" name="Inhaltsplatzhalter 2">
+              <a:t>Sicherheitslücken in CMS Installationen</a:t>
+            </a:r>
+            <a:endParaRPr lang="en-US" dirty="0"/>
+          </a:p>
+        </p:txBody>
+      </p:sp>
+      <p:sp>
+        <p:nvSpPr>
+          <p:cNvPr id="3" name="Content Placeholder 2">
             <a:extLst>
               <a:ext uri="{FF2B5EF4-FFF2-40B4-BE49-F238E27FC236}">
-                <a16:creationId xmlns:a16="http://schemas.microsoft.com/office/drawing/2014/main" id="{E43E0C27-4BE5-4ADC-8927-541E9617BA14}"/>
+                <a16:creationId xmlns:a16="http://schemas.microsoft.com/office/drawing/2014/main" id="{B8D27682-E97D-4755-9D18-F43BE1A015A1}"/>
               </a:ext>
             </a:extLst>
           </p:cNvPr>
@@ -6581,57 +7654,182 @@
           <a:lstStyle/>
           <a:p>
             <a:r>
-              <a:rPr lang="de-CH" dirty="0"/>
-              <a:t>Robots.txt</a:t>
-            </a:r>
-          </a:p>
-          <a:p>
-            <a:pPr lvl="1"/>
-            <a:r>
-              <a:rPr lang="de-CH" dirty="0"/>
-              <a:t>Text Datei die angibt, wie die Website gescannt werden darf</a:t>
+              <a:rPr lang="de-DE" dirty="0"/>
+              <a:t>Veraltete CMS Version</a:t>
+            </a:r>
+          </a:p>
+          <a:p>
+            <a:r>
+              <a:rPr lang="de-DE" dirty="0"/>
+              <a:t>CMS / CMS Version lässt sich aus HTML auslesen</a:t>
+            </a:r>
+          </a:p>
+          <a:p>
+            <a:r>
+              <a:rPr lang="de-DE" dirty="0"/>
+              <a:t>Admin Login lässts sich über bekannten Weg aufrufen</a:t>
+            </a:r>
+          </a:p>
+          <a:p>
+            <a:r>
+              <a:rPr lang="en-US" dirty="0"/>
+              <a:t>Pass wort/Username</a:t>
+            </a:r>
+          </a:p>
+          <a:p>
+            <a:r>
+              <a:rPr lang="en-US" dirty="0"/>
+              <a:t>Plugins/Themes</a:t>
+            </a:r>
+          </a:p>
+          <a:p>
+            <a:r>
+              <a:rPr lang="en-US" dirty="0"/>
+              <a:t>Hosting</a:t>
             </a:r>
           </a:p>
           <a:p>
             <a:pPr marL="0" indent="0">
               <a:buNone/>
             </a:pPr>
-            <a:endParaRPr lang="de-CH" dirty="0"/>
-          </a:p>
-          <a:p>
-            <a:r>
-              <a:rPr lang="de-CH" dirty="0"/>
-              <a:t>HTML Meta-Tag</a:t>
-            </a:r>
-          </a:p>
-          <a:p>
-            <a:pPr lvl="1"/>
-            <a:r>
-              <a:rPr lang="en-US" dirty="0"/>
-              <a:t>&lt;META NAME="ROBOTS" CONTENT="NOINDEX, NOFOLLOW"&gt;</a:t>
-            </a:r>
-            <a:endParaRPr lang="de-CH" dirty="0"/>
-          </a:p>
-          <a:p>
-            <a:pPr lvl="1"/>
-            <a:endParaRPr lang="de-CH" dirty="0"/>
-          </a:p>
-          <a:p>
-            <a:pPr lvl="1"/>
-            <a:endParaRPr lang="de-CH" dirty="0"/>
-          </a:p>
-          <a:p>
-            <a:r>
-              <a:rPr lang="de-CH" dirty="0"/>
-              <a:t>Webcrawler müssen sich nicht daran halten</a:t>
-            </a:r>
+            <a:r>
+              <a:rPr lang="en-US" sz="4400" dirty="0" err="1">
+                <a:solidFill>
+                  <a:srgbClr val="FF0000"/>
+                </a:solidFill>
+              </a:rPr>
+              <a:t>viele</a:t>
+            </a:r>
+            <a:r>
+              <a:rPr lang="en-US" sz="4400" dirty="0">
+                <a:solidFill>
+                  <a:srgbClr val="FF0000"/>
+                </a:solidFill>
+              </a:rPr>
+              <a:t> </a:t>
+            </a:r>
+            <a:r>
+              <a:rPr lang="en-US" sz="4400" dirty="0" err="1">
+                <a:solidFill>
+                  <a:srgbClr val="FF0000"/>
+                </a:solidFill>
+              </a:rPr>
+              <a:t>dieser</a:t>
+            </a:r>
+            <a:r>
+              <a:rPr lang="en-US" sz="4400" dirty="0">
+                <a:solidFill>
+                  <a:srgbClr val="FF0000"/>
+                </a:solidFill>
+              </a:rPr>
+              <a:t> </a:t>
+            </a:r>
+            <a:r>
+              <a:rPr lang="en-US" sz="4400" dirty="0" err="1">
+                <a:solidFill>
+                  <a:srgbClr val="FF0000"/>
+                </a:solidFill>
+              </a:rPr>
+              <a:t>Lücken</a:t>
+            </a:r>
+            <a:r>
+              <a:rPr lang="en-US" sz="4400" dirty="0">
+                <a:solidFill>
+                  <a:srgbClr val="FF0000"/>
+                </a:solidFill>
+              </a:rPr>
+              <a:t> </a:t>
+            </a:r>
+            <a:r>
+              <a:rPr lang="en-US" sz="4400" dirty="0" err="1">
+                <a:solidFill>
+                  <a:srgbClr val="FF0000"/>
+                </a:solidFill>
+              </a:rPr>
+              <a:t>lassen</a:t>
+            </a:r>
+            <a:r>
+              <a:rPr lang="en-US" sz="4400" dirty="0">
+                <a:solidFill>
+                  <a:srgbClr val="FF0000"/>
+                </a:solidFill>
+              </a:rPr>
+              <a:t> </a:t>
+            </a:r>
+            <a:r>
+              <a:rPr lang="en-US" sz="4400" dirty="0" err="1">
+                <a:solidFill>
+                  <a:srgbClr val="FF0000"/>
+                </a:solidFill>
+              </a:rPr>
+              <a:t>sich</a:t>
+            </a:r>
+            <a:r>
+              <a:rPr lang="en-US" sz="4400" dirty="0">
+                <a:solidFill>
+                  <a:srgbClr val="FF0000"/>
+                </a:solidFill>
+              </a:rPr>
+              <a:t> </a:t>
+            </a:r>
+            <a:r>
+              <a:rPr lang="en-US" sz="4400" dirty="0" err="1">
+                <a:solidFill>
+                  <a:srgbClr val="FF0000"/>
+                </a:solidFill>
+              </a:rPr>
+              <a:t>mit</a:t>
+            </a:r>
+            <a:r>
+              <a:rPr lang="en-US" sz="4400" dirty="0">
+                <a:solidFill>
+                  <a:srgbClr val="FF0000"/>
+                </a:solidFill>
+              </a:rPr>
+              <a:t> </a:t>
+            </a:r>
+            <a:r>
+              <a:rPr lang="en-US" sz="4400" dirty="0" err="1">
+                <a:solidFill>
+                  <a:srgbClr val="FF0000"/>
+                </a:solidFill>
+              </a:rPr>
+              <a:t>webcrawling</a:t>
+            </a:r>
+            <a:r>
+              <a:rPr lang="en-US" sz="4400" dirty="0">
+                <a:solidFill>
+                  <a:srgbClr val="FF0000"/>
+                </a:solidFill>
+              </a:rPr>
+              <a:t> </a:t>
+            </a:r>
+            <a:r>
+              <a:rPr lang="en-US" sz="4400" dirty="0" err="1">
+                <a:solidFill>
+                  <a:srgbClr val="FF0000"/>
+                </a:solidFill>
+              </a:rPr>
+              <a:t>finden</a:t>
+            </a:r>
+            <a:r>
+              <a:rPr lang="en-US" sz="4400" dirty="0">
+                <a:solidFill>
+                  <a:srgbClr val="FF0000"/>
+                </a:solidFill>
+              </a:rPr>
+              <a:t>!!</a:t>
+            </a:r>
+          </a:p>
+          <a:p>
+            <a:endParaRPr lang="en-US" dirty="0"/>
           </a:p>
         </p:txBody>
       </p:sp>
     </p:spTree>
     <p:extLst>
       <p:ext uri="{BB962C8B-B14F-4D97-AF65-F5344CB8AC3E}">
-        <p14:creationId xmlns:p14="http://schemas.microsoft.com/office/powerpoint/2010/main" val="3744882744"/>
+        <p14:creationId xmlns:p14="http://schemas.microsoft.com/office/powerpoint/2010/main" val="2871628549"/>
       </p:ext>
     </p:extLst>
   </p:cSld>
@@ -6644,6 +7842,31 @@
 <file path=ppt/slides/slide4.xml><?xml version="1.0" encoding="utf-8"?>
 <p:sld xmlns:a="http://schemas.openxmlformats.org/drawingml/2006/main" xmlns:r="http://schemas.openxmlformats.org/officeDocument/2006/relationships" xmlns:p="http://schemas.openxmlformats.org/presentationml/2006/main">
   <p:cSld>
+    <p:bg>
+      <p:bgPr>
+        <a:blipFill rotWithShape="1">
+          <a:blip r:embed="rId3">
+            <a:duotone>
+              <a:schemeClr val="bg2">
+                <a:shade val="62000"/>
+                <a:hueMod val="108000"/>
+                <a:satMod val="164000"/>
+                <a:lumMod val="69000"/>
+              </a:schemeClr>
+              <a:schemeClr val="bg2">
+                <a:tint val="96000"/>
+                <a:hueMod val="90000"/>
+                <a:satMod val="130000"/>
+                <a:lumMod val="134000"/>
+              </a:schemeClr>
+            </a:duotone>
+            <a:extLst/>
+          </a:blip>
+          <a:stretch/>
+        </a:blipFill>
+        <a:effectLst/>
+      </p:bgPr>
+    </p:bg>
     <p:spTree>
       <p:nvGrpSpPr>
         <p:cNvPr id="1" name=""/>
@@ -6663,7 +7886,7 @@
           <p:cNvPr id="2" name="Titel 1">
             <a:extLst>
               <a:ext uri="{FF2B5EF4-FFF2-40B4-BE49-F238E27FC236}">
-                <a16:creationId xmlns:a16="http://schemas.microsoft.com/office/drawing/2014/main" id="{CB50DA2B-AA7F-4B09-B3D5-FCB4B4D1371F}"/>
+                <a16:creationId xmlns:a16="http://schemas.microsoft.com/office/drawing/2014/main" id="{75095E51-B084-4B57-8352-590844DE72EF}"/>
               </a:ext>
             </a:extLst>
           </p:cNvPr>
@@ -6674,30 +7897,21 @@
             <p:ph type="title"/>
           </p:nvPr>
         </p:nvSpPr>
-        <p:spPr/>
-        <p:txBody>
-          <a:bodyPr/>
-          <a:lstStyle/>
-          <a:p>
-            <a:r>
-              <a:rPr lang="de-CH" dirty="0" err="1">
-                <a:solidFill>
-                  <a:srgbClr val="FF0000"/>
-                </a:solidFill>
-              </a:rPr>
-              <a:t>Evt</a:t>
-            </a:r>
+        <p:spPr>
+          <a:xfrm>
+            <a:off x="648929" y="629266"/>
+            <a:ext cx="3505495" cy="1622321"/>
+          </a:xfrm>
+        </p:spPr>
+        <p:txBody>
+          <a:bodyPr>
+            <a:normAutofit/>
+          </a:bodyPr>
+          <a:lstStyle/>
+          <a:p>
             <a:r>
               <a:rPr lang="de-CH" dirty="0"/>
-              <a:t>: Webcrawler in </a:t>
-            </a:r>
-            <a:r>
-              <a:rPr lang="de-CH" dirty="0" err="1"/>
-              <a:t>deept</a:t>
-            </a:r>
-            <a:r>
-              <a:rPr lang="de-CH" dirty="0"/>
-              <a:t>/code erklären</a:t>
+              <a:t>Webcrawler</a:t>
             </a:r>
           </a:p>
         </p:txBody>
@@ -6707,7 +7921,7 @@
           <p:cNvPr id="3" name="Inhaltsplatzhalter 2">
             <a:extLst>
               <a:ext uri="{FF2B5EF4-FFF2-40B4-BE49-F238E27FC236}">
-                <a16:creationId xmlns:a16="http://schemas.microsoft.com/office/drawing/2014/main" id="{250077A3-CEB6-4E4B-8F1D-99756E615CC2}"/>
+                <a16:creationId xmlns:a16="http://schemas.microsoft.com/office/drawing/2014/main" id="{B8F1EC26-8C22-47D3-ACC9-101B2629A8DD}"/>
               </a:ext>
             </a:extLst>
           </p:cNvPr>
@@ -6718,19 +7932,1068 @@
             <p:ph idx="1"/>
           </p:nvPr>
         </p:nvSpPr>
-        <p:spPr/>
-        <p:txBody>
-          <a:bodyPr/>
-          <a:lstStyle/>
-          <a:p>
+        <p:spPr>
+          <a:xfrm>
+            <a:off x="648930" y="1707357"/>
+            <a:ext cx="3505494" cy="3785419"/>
+          </a:xfrm>
+        </p:spPr>
+        <p:txBody>
+          <a:bodyPr>
+            <a:normAutofit/>
+          </a:bodyPr>
+          <a:lstStyle/>
+          <a:p>
+            <a:pPr marL="457200" indent="-457200">
+              <a:buFont typeface="+mj-lt"/>
+              <a:buAutoNum type="arabicPeriod"/>
+            </a:pPr>
+            <a:r>
+              <a:rPr lang="de-CH" dirty="0"/>
+              <a:t>Startet bei einer URL</a:t>
+            </a:r>
+          </a:p>
+          <a:p>
+            <a:pPr marL="457200" indent="-457200">
+              <a:buFont typeface="+mj-lt"/>
+              <a:buAutoNum type="arabicPeriod"/>
+            </a:pPr>
+            <a:r>
+              <a:rPr lang="de-CH" dirty="0"/>
+              <a:t>Scannt Website auf Hyperlinks und speichert Daten</a:t>
+            </a:r>
+          </a:p>
+          <a:p>
+            <a:pPr marL="457200" indent="-457200">
+              <a:buFont typeface="+mj-lt"/>
+              <a:buAutoNum type="arabicPeriod"/>
+            </a:pPr>
+            <a:r>
+              <a:rPr lang="de-CH" dirty="0"/>
+              <a:t>Hyperlinks werden Queue hinzugefügt</a:t>
+            </a:r>
+          </a:p>
+          <a:p>
+            <a:pPr marL="457200" indent="-457200">
+              <a:buFont typeface="+mj-lt"/>
+              <a:buAutoNum type="arabicPeriod"/>
+            </a:pPr>
+            <a:r>
+              <a:rPr lang="de-CH" dirty="0"/>
+              <a:t>Scannt nächste Website in der Queue und speichert Daten</a:t>
+            </a:r>
+          </a:p>
+          <a:p>
+            <a:pPr marL="457200" indent="-457200">
+              <a:buFont typeface="+mj-lt"/>
+              <a:buAutoNum type="arabicPeriod"/>
+            </a:pPr>
+            <a:r>
+              <a:rPr lang="de-CH" dirty="0"/>
+              <a:t>Usw.</a:t>
+            </a:r>
+          </a:p>
+          <a:p>
+            <a:pPr marL="457200" indent="-457200">
+              <a:buFont typeface="+mj-lt"/>
+              <a:buAutoNum type="arabicPeriod"/>
+            </a:pPr>
             <a:endParaRPr lang="de-CH" dirty="0"/>
+          </a:p>
+          <a:p>
+            <a:pPr marL="457200" indent="-457200">
+              <a:buFont typeface="+mj-lt"/>
+              <a:buAutoNum type="arabicPeriod"/>
+            </a:pPr>
+            <a:endParaRPr lang="de-CH" dirty="0"/>
+          </a:p>
+        </p:txBody>
+      </p:sp>
+      <p:sp>
+        <p:nvSpPr>
+          <p:cNvPr id="71" name="Rectangle 70">
+            <a:extLst>
+              <a:ext uri="{FF2B5EF4-FFF2-40B4-BE49-F238E27FC236}">
+                <a16:creationId xmlns:a16="http://schemas.microsoft.com/office/drawing/2014/main" id="{E76BDDC1-3B8A-4ED1-9384-28046DA7DFFF}"/>
+              </a:ext>
+              <a:ext uri="{C183D7F6-B498-43B3-948B-1728B52AA6E4}">
+                <adec:decorative xmlns:adec="http://schemas.microsoft.com/office/drawing/2017/decorative" val="1"/>
+              </a:ext>
+            </a:extLst>
+          </p:cNvPr>
+          <p:cNvSpPr>
+            <a:spLocks noGrp="1" noRot="1" noChangeAspect="1" noMove="1" noResize="1" noEditPoints="1" noAdjustHandles="1" noChangeArrowheads="1" noChangeShapeType="1" noTextEdit="1"/>
+          </p:cNvSpPr>
+          <p:nvPr>
+            <p:extLst>
+              <p:ext uri="{386F3935-93C4-4BCD-93E2-E3B085C9AB24}">
+                <p16:designElem xmlns:p16="http://schemas.microsoft.com/office/powerpoint/2015/main" val="1"/>
+              </p:ext>
+            </p:extLst>
+          </p:nvPr>
+        </p:nvSpPr>
+        <p:spPr>
+          <a:xfrm>
+            <a:off x="4639056" y="0"/>
+            <a:ext cx="7552944" cy="6858000"/>
+          </a:xfrm>
+          <a:prstGeom prst="rect">
+            <a:avLst/>
+          </a:prstGeom>
+          <a:solidFill>
+            <a:srgbClr val="FFFFFF"/>
+          </a:solidFill>
+          <a:ln>
+            <a:noFill/>
+          </a:ln>
+        </p:spPr>
+        <p:style>
+          <a:lnRef idx="2">
+            <a:schemeClr val="accent1">
+              <a:shade val="50000"/>
+            </a:schemeClr>
+          </a:lnRef>
+          <a:fillRef idx="1">
+            <a:schemeClr val="accent1"/>
+          </a:fillRef>
+          <a:effectRef idx="0">
+            <a:schemeClr val="accent1"/>
+          </a:effectRef>
+          <a:fontRef idx="minor">
+            <a:schemeClr val="lt1"/>
+          </a:fontRef>
+        </p:style>
+        <p:txBody>
+          <a:bodyPr rtlCol="0" anchor="ctr"/>
+          <a:lstStyle/>
+          <a:p>
+            <a:pPr algn="ctr"/>
+            <a:endParaRPr lang="en-US"/>
+          </a:p>
+        </p:txBody>
+      </p:sp>
+      <p:sp>
+        <p:nvSpPr>
+          <p:cNvPr id="73" name="Rounded Rectangle 9">
+            <a:extLst>
+              <a:ext uri="{FF2B5EF4-FFF2-40B4-BE49-F238E27FC236}">
+                <a16:creationId xmlns:a16="http://schemas.microsoft.com/office/drawing/2014/main" id="{A4C54E1D-046B-434B-8B3E-C179D9913307}"/>
+              </a:ext>
+              <a:ext uri="{C183D7F6-B498-43B3-948B-1728B52AA6E4}">
+                <adec:decorative xmlns:adec="http://schemas.microsoft.com/office/drawing/2017/decorative" val="1"/>
+              </a:ext>
+            </a:extLst>
+          </p:cNvPr>
+          <p:cNvSpPr>
+            <a:spLocks noGrp="1" noRot="1" noChangeAspect="1" noMove="1" noResize="1" noEditPoints="1" noAdjustHandles="1" noChangeArrowheads="1" noChangeShapeType="1" noTextEdit="1"/>
+          </p:cNvSpPr>
+          <p:nvPr>
+            <p:extLst>
+              <p:ext uri="{386F3935-93C4-4BCD-93E2-E3B085C9AB24}">
+                <p16:designElem xmlns:p16="http://schemas.microsoft.com/office/powerpoint/2015/main" val="1"/>
+              </p:ext>
+            </p:extLst>
+          </p:nvPr>
+        </p:nvSpPr>
+        <p:spPr>
+          <a:xfrm>
+            <a:off x="5123688" y="484632"/>
+            <a:ext cx="6584098" cy="5739187"/>
+          </a:xfrm>
+          <a:prstGeom prst="roundRect">
+            <a:avLst>
+              <a:gd name="adj" fmla="val 0"/>
+            </a:avLst>
+          </a:prstGeom>
+          <a:solidFill>
+            <a:schemeClr val="tx1"/>
+          </a:solidFill>
+          <a:ln w="12700">
+            <a:solidFill>
+              <a:schemeClr val="tx2">
+                <a:lumMod val="75000"/>
+              </a:schemeClr>
+            </a:solidFill>
+          </a:ln>
+          <a:effectLst>
+            <a:outerShdw blurRad="50800" dist="50800" dir="5400000" algn="tl" rotWithShape="0">
+              <a:srgbClr val="000000">
+                <a:alpha val="43000"/>
+              </a:srgbClr>
+            </a:outerShdw>
+          </a:effectLst>
+        </p:spPr>
+        <p:style>
+          <a:lnRef idx="2">
+            <a:schemeClr val="accent1">
+              <a:shade val="50000"/>
+            </a:schemeClr>
+          </a:lnRef>
+          <a:fillRef idx="1">
+            <a:schemeClr val="accent1"/>
+          </a:fillRef>
+          <a:effectRef idx="0">
+            <a:schemeClr val="accent1"/>
+          </a:effectRef>
+          <a:fontRef idx="minor">
+            <a:schemeClr val="lt1"/>
+          </a:fontRef>
+        </p:style>
+        <p:txBody>
+          <a:bodyPr rtlCol="0" anchor="ctr"/>
+          <a:lstStyle/>
+          <a:p>
+            <a:pPr algn="ctr"/>
+            <a:endParaRPr lang="en-US"/>
+          </a:p>
+        </p:txBody>
+      </p:sp>
+      <p:pic>
+        <p:nvPicPr>
+          <p:cNvPr id="1026" name="Picture 2" descr="Bildergebnis fÃ¼r web crawler">
+            <a:extLst>
+              <a:ext uri="{FF2B5EF4-FFF2-40B4-BE49-F238E27FC236}">
+                <a16:creationId xmlns:a16="http://schemas.microsoft.com/office/drawing/2014/main" id="{B3957BB3-D46C-46CA-BDA0-66EDF695568F}"/>
+              </a:ext>
+            </a:extLst>
+          </p:cNvPr>
+          <p:cNvPicPr>
+            <a:picLocks noChangeAspect="1" noChangeArrowheads="1"/>
+          </p:cNvPicPr>
+          <p:nvPr/>
+        </p:nvPicPr>
+        <p:blipFill>
+          <a:blip r:embed="rId4">
+            <a:extLst>
+              <a:ext uri="{28A0092B-C50C-407E-A947-70E740481C1C}">
+                <a14:useLocalDpi xmlns:a14="http://schemas.microsoft.com/office/drawing/2010/main" val="0"/>
+              </a:ext>
+            </a:extLst>
+          </a:blip>
+          <a:stretch>
+            <a:fillRect/>
+          </a:stretch>
+        </p:blipFill>
+        <p:spPr bwMode="auto">
+          <a:xfrm>
+            <a:off x="5340906" y="1707357"/>
+            <a:ext cx="6149662" cy="3290068"/>
+          </a:xfrm>
+          <a:prstGeom prst="rect">
+            <a:avLst/>
+          </a:prstGeom>
+          <a:noFill/>
+          <a:effectLst/>
+          <a:extLst>
+            <a:ext uri="{909E8E84-426E-40DD-AFC4-6F175D3DCCD1}">
+              <a14:hiddenFill xmlns:a14="http://schemas.microsoft.com/office/drawing/2010/main">
+                <a:solidFill>
+                  <a:srgbClr val="FFFFFF"/>
+                </a:solidFill>
+              </a14:hiddenFill>
+            </a:ext>
+          </a:extLst>
+        </p:spPr>
+      </p:pic>
+      <p:sp>
+        <p:nvSpPr>
+          <p:cNvPr id="16" name="Rectangle 15">
+            <a:extLst>
+              <a:ext uri="{FF2B5EF4-FFF2-40B4-BE49-F238E27FC236}">
+                <a16:creationId xmlns:a16="http://schemas.microsoft.com/office/drawing/2014/main" id="{647B04BC-2F7A-4F8C-84C3-5FE0A143AED2}"/>
+              </a:ext>
+            </a:extLst>
+          </p:cNvPr>
+          <p:cNvSpPr/>
+          <p:nvPr/>
+        </p:nvSpPr>
+        <p:spPr>
+          <a:xfrm>
+            <a:off x="9383949" y="4119083"/>
+            <a:ext cx="360000" cy="294356"/>
+          </a:xfrm>
+          <a:prstGeom prst="rect">
+            <a:avLst/>
+          </a:prstGeom>
+          <a:solidFill>
+            <a:schemeClr val="tx1"/>
+          </a:solidFill>
+          <a:ln>
+            <a:solidFill>
+              <a:schemeClr val="tx1"/>
+            </a:solidFill>
+          </a:ln>
+        </p:spPr>
+        <p:style>
+          <a:lnRef idx="2">
+            <a:schemeClr val="accent1">
+              <a:shade val="50000"/>
+            </a:schemeClr>
+          </a:lnRef>
+          <a:fillRef idx="1">
+            <a:schemeClr val="accent1"/>
+          </a:fillRef>
+          <a:effectRef idx="0">
+            <a:schemeClr val="accent1"/>
+          </a:effectRef>
+          <a:fontRef idx="minor">
+            <a:schemeClr val="lt1"/>
+          </a:fontRef>
+        </p:style>
+        <p:txBody>
+          <a:bodyPr rtlCol="0" anchor="ctr"/>
+          <a:lstStyle/>
+          <a:p>
+            <a:pPr algn="ctr"/>
+            <a:r>
+              <a:rPr lang="de-DE" sz="900" b="1" dirty="0" err="1">
+                <a:solidFill>
+                  <a:schemeClr val="bg2">
+                    <a:lumMod val="75000"/>
+                  </a:schemeClr>
+                </a:solidFill>
+              </a:rPr>
+              <a:t>No</a:t>
+            </a:r>
+            <a:endParaRPr lang="en-US" sz="1000" b="1" dirty="0">
+              <a:solidFill>
+                <a:schemeClr val="bg2">
+                  <a:lumMod val="75000"/>
+                </a:schemeClr>
+              </a:solidFill>
+            </a:endParaRPr>
+          </a:p>
+        </p:txBody>
+      </p:sp>
+      <p:sp>
+        <p:nvSpPr>
+          <p:cNvPr id="75" name="Rectangle 74">
+            <a:extLst>
+              <a:ext uri="{FF2B5EF4-FFF2-40B4-BE49-F238E27FC236}">
+                <a16:creationId xmlns:a16="http://schemas.microsoft.com/office/drawing/2014/main" id="{CD62FCDA-81D0-4D28-B17F-CC6E3206841E}"/>
+              </a:ext>
+              <a:ext uri="{C183D7F6-B498-43B3-948B-1728B52AA6E4}">
+                <adec:decorative xmlns:adec="http://schemas.microsoft.com/office/drawing/2017/decorative" val="1"/>
+              </a:ext>
+            </a:extLst>
+          </p:cNvPr>
+          <p:cNvSpPr>
+            <a:spLocks noGrp="1" noRot="1" noChangeAspect="1" noMove="1" noResize="1" noEditPoints="1" noAdjustHandles="1" noChangeArrowheads="1" noChangeShapeType="1" noTextEdit="1"/>
+          </p:cNvSpPr>
+          <p:nvPr>
+            <p:extLst>
+              <p:ext uri="{386F3935-93C4-4BCD-93E2-E3B085C9AB24}">
+                <p16:designElem xmlns:p16="http://schemas.microsoft.com/office/powerpoint/2015/main" val="1"/>
+              </p:ext>
+            </p:extLst>
+          </p:nvPr>
+        </p:nvSpPr>
+        <p:spPr>
+          <a:xfrm>
+            <a:off x="10442448" y="0"/>
+            <a:ext cx="685800" cy="1143000"/>
+          </a:xfrm>
+          <a:prstGeom prst="rect">
+            <a:avLst/>
+          </a:prstGeom>
+          <a:solidFill>
+            <a:schemeClr val="accent1"/>
+          </a:solidFill>
+          <a:ln>
+            <a:noFill/>
+          </a:ln>
+        </p:spPr>
+        <p:style>
+          <a:lnRef idx="1">
+            <a:schemeClr val="accent1"/>
+          </a:lnRef>
+          <a:fillRef idx="3">
+            <a:schemeClr val="accent1"/>
+          </a:fillRef>
+          <a:effectRef idx="2">
+            <a:schemeClr val="accent1"/>
+          </a:effectRef>
+          <a:fontRef idx="minor">
+            <a:schemeClr val="lt1"/>
+          </a:fontRef>
+        </p:style>
+      </p:sp>
+      <p:sp>
+        <p:nvSpPr>
+          <p:cNvPr id="4" name="Rectangle 3">
+            <a:extLst>
+              <a:ext uri="{FF2B5EF4-FFF2-40B4-BE49-F238E27FC236}">
+                <a16:creationId xmlns:a16="http://schemas.microsoft.com/office/drawing/2014/main" id="{351732A9-EC93-448F-A486-04ADEE10F8F2}"/>
+              </a:ext>
+            </a:extLst>
+          </p:cNvPr>
+          <p:cNvSpPr/>
+          <p:nvPr/>
+        </p:nvSpPr>
+        <p:spPr>
+          <a:xfrm>
+            <a:off x="8884597" y="2832623"/>
+            <a:ext cx="867282" cy="338594"/>
+          </a:xfrm>
+          <a:prstGeom prst="rect">
+            <a:avLst/>
+          </a:prstGeom>
+          <a:solidFill>
+            <a:schemeClr val="tx1"/>
+          </a:solidFill>
+          <a:ln>
+            <a:solidFill>
+              <a:schemeClr val="bg2">
+                <a:lumMod val="75000"/>
+              </a:schemeClr>
+            </a:solidFill>
+          </a:ln>
+        </p:spPr>
+        <p:style>
+          <a:lnRef idx="2">
+            <a:schemeClr val="accent1">
+              <a:shade val="50000"/>
+            </a:schemeClr>
+          </a:lnRef>
+          <a:fillRef idx="1">
+            <a:schemeClr val="accent1"/>
+          </a:fillRef>
+          <a:effectRef idx="0">
+            <a:schemeClr val="accent1"/>
+          </a:effectRef>
+          <a:fontRef idx="minor">
+            <a:schemeClr val="lt1"/>
+          </a:fontRef>
+        </p:style>
+        <p:txBody>
+          <a:bodyPr rtlCol="0" anchor="ctr"/>
+          <a:lstStyle/>
+          <a:p>
+            <a:pPr algn="ctr"/>
+            <a:r>
+              <a:rPr lang="de-DE" sz="1000" b="1" dirty="0">
+                <a:solidFill>
+                  <a:schemeClr val="bg2">
+                    <a:lumMod val="75000"/>
+                  </a:schemeClr>
+                </a:solidFill>
+              </a:rPr>
+              <a:t>Check URL</a:t>
+            </a:r>
+            <a:endParaRPr lang="en-US" sz="1000" b="1" dirty="0">
+              <a:solidFill>
+                <a:schemeClr val="bg2">
+                  <a:lumMod val="75000"/>
+                </a:schemeClr>
+              </a:solidFill>
+            </a:endParaRPr>
+          </a:p>
+        </p:txBody>
+      </p:sp>
+      <p:sp>
+        <p:nvSpPr>
+          <p:cNvPr id="14" name="Rectangle 13">
+            <a:extLst>
+              <a:ext uri="{FF2B5EF4-FFF2-40B4-BE49-F238E27FC236}">
+                <a16:creationId xmlns:a16="http://schemas.microsoft.com/office/drawing/2014/main" id="{04EFC4C2-47F0-4164-B5DE-96A89C6D4894}"/>
+              </a:ext>
+            </a:extLst>
+          </p:cNvPr>
+          <p:cNvSpPr/>
+          <p:nvPr/>
+        </p:nvSpPr>
+        <p:spPr>
+          <a:xfrm>
+            <a:off x="8884597" y="4461753"/>
+            <a:ext cx="867282" cy="390984"/>
+          </a:xfrm>
+          <a:prstGeom prst="rect">
+            <a:avLst/>
+          </a:prstGeom>
+          <a:solidFill>
+            <a:schemeClr val="tx1"/>
+          </a:solidFill>
+          <a:ln>
+            <a:solidFill>
+              <a:schemeClr val="bg2">
+                <a:lumMod val="75000"/>
+              </a:schemeClr>
+            </a:solidFill>
+          </a:ln>
+        </p:spPr>
+        <p:style>
+          <a:lnRef idx="2">
+            <a:schemeClr val="accent1">
+              <a:shade val="50000"/>
+            </a:schemeClr>
+          </a:lnRef>
+          <a:fillRef idx="1">
+            <a:schemeClr val="accent1"/>
+          </a:fillRef>
+          <a:effectRef idx="0">
+            <a:schemeClr val="accent1"/>
+          </a:effectRef>
+          <a:fontRef idx="minor">
+            <a:schemeClr val="lt1"/>
+          </a:fontRef>
+        </p:style>
+        <p:txBody>
+          <a:bodyPr rtlCol="0" anchor="ctr"/>
+          <a:lstStyle/>
+          <a:p>
+            <a:pPr algn="ctr"/>
+            <a:r>
+              <a:rPr lang="de-DE" sz="1000" b="1" dirty="0">
+                <a:solidFill>
+                  <a:schemeClr val="bg2">
+                    <a:lumMod val="75000"/>
+                  </a:schemeClr>
+                </a:solidFill>
+              </a:rPr>
+              <a:t>Save </a:t>
+            </a:r>
+            <a:r>
+              <a:rPr lang="de-DE" sz="1000" b="1" dirty="0" err="1">
+                <a:solidFill>
+                  <a:schemeClr val="bg2">
+                    <a:lumMod val="75000"/>
+                  </a:schemeClr>
+                </a:solidFill>
+              </a:rPr>
+              <a:t>document</a:t>
+            </a:r>
+            <a:endParaRPr lang="en-US" sz="1000" b="1" dirty="0">
+              <a:solidFill>
+                <a:schemeClr val="bg2">
+                  <a:lumMod val="75000"/>
+                </a:schemeClr>
+              </a:solidFill>
+            </a:endParaRPr>
+          </a:p>
+        </p:txBody>
+      </p:sp>
+      <p:sp>
+        <p:nvSpPr>
+          <p:cNvPr id="17" name="Rectangle 16">
+            <a:extLst>
+              <a:ext uri="{FF2B5EF4-FFF2-40B4-BE49-F238E27FC236}">
+                <a16:creationId xmlns:a16="http://schemas.microsoft.com/office/drawing/2014/main" id="{9AD828AA-EE7E-4460-B2CF-24114CECCBA0}"/>
+              </a:ext>
+            </a:extLst>
+          </p:cNvPr>
+          <p:cNvSpPr/>
+          <p:nvPr/>
+        </p:nvSpPr>
+        <p:spPr>
+          <a:xfrm>
+            <a:off x="9750325" y="3487365"/>
+            <a:ext cx="476688" cy="255446"/>
+          </a:xfrm>
+          <a:prstGeom prst="rect">
+            <a:avLst/>
+          </a:prstGeom>
+          <a:solidFill>
+            <a:schemeClr val="tx1"/>
+          </a:solidFill>
+          <a:ln>
+            <a:solidFill>
+              <a:schemeClr val="tx1"/>
+            </a:solidFill>
+          </a:ln>
+        </p:spPr>
+        <p:style>
+          <a:lnRef idx="2">
+            <a:schemeClr val="accent1">
+              <a:shade val="50000"/>
+            </a:schemeClr>
+          </a:lnRef>
+          <a:fillRef idx="1">
+            <a:schemeClr val="accent1"/>
+          </a:fillRef>
+          <a:effectRef idx="0">
+            <a:schemeClr val="accent1"/>
+          </a:effectRef>
+          <a:fontRef idx="minor">
+            <a:schemeClr val="lt1"/>
+          </a:fontRef>
+        </p:style>
+        <p:txBody>
+          <a:bodyPr rtlCol="0" anchor="b"/>
+          <a:lstStyle/>
+          <a:p>
+            <a:pPr algn="ctr"/>
+            <a:r>
+              <a:rPr lang="de-DE" sz="900" b="1" dirty="0">
+                <a:solidFill>
+                  <a:schemeClr val="bg2">
+                    <a:lumMod val="75000"/>
+                  </a:schemeClr>
+                </a:solidFill>
+              </a:rPr>
+              <a:t>Yes</a:t>
+            </a:r>
+            <a:endParaRPr lang="en-US" sz="1000" b="1" dirty="0">
+              <a:solidFill>
+                <a:schemeClr val="bg2">
+                  <a:lumMod val="75000"/>
+                </a:schemeClr>
+              </a:solidFill>
+            </a:endParaRPr>
+          </a:p>
+        </p:txBody>
+      </p:sp>
+      <p:sp>
+        <p:nvSpPr>
+          <p:cNvPr id="18" name="Rectangle 17">
+            <a:extLst>
+              <a:ext uri="{FF2B5EF4-FFF2-40B4-BE49-F238E27FC236}">
+                <a16:creationId xmlns:a16="http://schemas.microsoft.com/office/drawing/2014/main" id="{94D1D2E7-AE40-4F2A-8B5F-9712A0CBD326}"/>
+              </a:ext>
+            </a:extLst>
+          </p:cNvPr>
+          <p:cNvSpPr/>
+          <p:nvPr/>
+        </p:nvSpPr>
+        <p:spPr>
+          <a:xfrm>
+            <a:off x="10150487" y="3449745"/>
+            <a:ext cx="1224389" cy="669338"/>
+          </a:xfrm>
+          <a:prstGeom prst="rect">
+            <a:avLst/>
+          </a:prstGeom>
+          <a:solidFill>
+            <a:schemeClr val="tx1"/>
+          </a:solidFill>
+          <a:ln>
+            <a:solidFill>
+              <a:schemeClr val="bg2">
+                <a:lumMod val="75000"/>
+              </a:schemeClr>
+            </a:solidFill>
+          </a:ln>
+        </p:spPr>
+        <p:style>
+          <a:lnRef idx="2">
+            <a:schemeClr val="accent1">
+              <a:shade val="50000"/>
+            </a:schemeClr>
+          </a:lnRef>
+          <a:fillRef idx="1">
+            <a:schemeClr val="accent1"/>
+          </a:fillRef>
+          <a:effectRef idx="0">
+            <a:schemeClr val="accent1"/>
+          </a:effectRef>
+          <a:fontRef idx="minor">
+            <a:schemeClr val="lt1"/>
+          </a:fontRef>
+        </p:style>
+        <p:txBody>
+          <a:bodyPr rtlCol="0" anchor="ctr"/>
+          <a:lstStyle/>
+          <a:p>
+            <a:pPr algn="ctr"/>
+            <a:r>
+              <a:rPr lang="de-DE" sz="1000" b="1" dirty="0" err="1">
+                <a:solidFill>
+                  <a:schemeClr val="bg2">
+                    <a:lumMod val="75000"/>
+                  </a:schemeClr>
+                </a:solidFill>
+              </a:rPr>
+              <a:t>Get</a:t>
+            </a:r>
+            <a:r>
+              <a:rPr lang="de-DE" sz="1000" b="1" dirty="0">
+                <a:solidFill>
+                  <a:schemeClr val="bg2">
+                    <a:lumMod val="75000"/>
+                  </a:schemeClr>
+                </a:solidFill>
+              </a:rPr>
+              <a:t> </a:t>
+            </a:r>
+            <a:r>
+              <a:rPr lang="de-DE" sz="1000" b="1" dirty="0" err="1">
+                <a:solidFill>
+                  <a:schemeClr val="bg2">
+                    <a:lumMod val="75000"/>
+                  </a:schemeClr>
+                </a:solidFill>
+              </a:rPr>
+              <a:t>next</a:t>
+            </a:r>
+            <a:r>
+              <a:rPr lang="de-DE" sz="1000" b="1" dirty="0">
+                <a:solidFill>
+                  <a:schemeClr val="bg2">
+                    <a:lumMod val="75000"/>
+                  </a:schemeClr>
+                </a:solidFill>
+              </a:rPr>
+              <a:t> </a:t>
+            </a:r>
+            <a:r>
+              <a:rPr lang="de-DE" sz="1000" b="1" dirty="0" err="1">
+                <a:solidFill>
+                  <a:schemeClr val="bg2">
+                    <a:lumMod val="75000"/>
+                  </a:schemeClr>
+                </a:solidFill>
+              </a:rPr>
+              <a:t>Document</a:t>
+            </a:r>
+            <a:endParaRPr lang="en-US" sz="1000" b="1" dirty="0">
+              <a:solidFill>
+                <a:schemeClr val="bg2">
+                  <a:lumMod val="75000"/>
+                </a:schemeClr>
+              </a:solidFill>
+            </a:endParaRPr>
+          </a:p>
+        </p:txBody>
+      </p:sp>
+      <p:sp>
+        <p:nvSpPr>
+          <p:cNvPr id="5" name="Flowchart: Decision 4">
+            <a:extLst>
+              <a:ext uri="{FF2B5EF4-FFF2-40B4-BE49-F238E27FC236}">
+                <a16:creationId xmlns:a16="http://schemas.microsoft.com/office/drawing/2014/main" id="{DDABE92F-8EFE-4734-86DB-49BD91C614E6}"/>
+              </a:ext>
+            </a:extLst>
+          </p:cNvPr>
+          <p:cNvSpPr/>
+          <p:nvPr/>
+        </p:nvSpPr>
+        <p:spPr>
+          <a:xfrm>
+            <a:off x="8736961" y="3449745"/>
+            <a:ext cx="1162554" cy="669338"/>
+          </a:xfrm>
+          <a:prstGeom prst="flowChartDecision">
+            <a:avLst/>
+          </a:prstGeom>
+          <a:solidFill>
+            <a:schemeClr val="tx1"/>
+          </a:solidFill>
+          <a:ln>
+            <a:solidFill>
+              <a:schemeClr val="bg2">
+                <a:lumMod val="75000"/>
+              </a:schemeClr>
+            </a:solidFill>
+          </a:ln>
+        </p:spPr>
+        <p:style>
+          <a:lnRef idx="2">
+            <a:schemeClr val="accent1">
+              <a:shade val="50000"/>
+            </a:schemeClr>
+          </a:lnRef>
+          <a:fillRef idx="1">
+            <a:schemeClr val="accent1"/>
+          </a:fillRef>
+          <a:effectRef idx="0">
+            <a:schemeClr val="accent1"/>
+          </a:effectRef>
+          <a:fontRef idx="minor">
+            <a:schemeClr val="lt1"/>
+          </a:fontRef>
+        </p:style>
+        <p:txBody>
+          <a:bodyPr rtlCol="0" anchor="ctr"/>
+          <a:lstStyle/>
+          <a:p>
+            <a:pPr algn="ctr"/>
+            <a:r>
+              <a:rPr lang="de-DE" sz="1100" b="1" dirty="0">
+                <a:solidFill>
+                  <a:schemeClr val="bg2">
+                    <a:lumMod val="75000"/>
+                  </a:schemeClr>
+                </a:solidFill>
+              </a:rPr>
+              <a:t>URL in DB?</a:t>
+            </a:r>
+            <a:endParaRPr lang="en-US" b="1" dirty="0">
+              <a:solidFill>
+                <a:schemeClr val="bg2">
+                  <a:lumMod val="75000"/>
+                </a:schemeClr>
+              </a:solidFill>
+            </a:endParaRPr>
+          </a:p>
+        </p:txBody>
+      </p:sp>
+      <p:sp>
+        <p:nvSpPr>
+          <p:cNvPr id="19" name="Rectangle 18">
+            <a:extLst>
+              <a:ext uri="{FF2B5EF4-FFF2-40B4-BE49-F238E27FC236}">
+                <a16:creationId xmlns:a16="http://schemas.microsoft.com/office/drawing/2014/main" id="{5C2D6E8F-E3D3-4F58-9929-7D25ABE9A083}"/>
+              </a:ext>
+            </a:extLst>
+          </p:cNvPr>
+          <p:cNvSpPr/>
+          <p:nvPr/>
+        </p:nvSpPr>
+        <p:spPr>
+          <a:xfrm>
+            <a:off x="10818148" y="2942098"/>
+            <a:ext cx="520686" cy="185534"/>
+          </a:xfrm>
+          <a:prstGeom prst="rect">
+            <a:avLst/>
+          </a:prstGeom>
+          <a:solidFill>
+            <a:schemeClr val="tx1"/>
+          </a:solidFill>
+          <a:ln>
+            <a:solidFill>
+              <a:schemeClr val="tx1"/>
+            </a:solidFill>
+          </a:ln>
+        </p:spPr>
+        <p:style>
+          <a:lnRef idx="2">
+            <a:schemeClr val="accent1">
+              <a:shade val="50000"/>
+            </a:schemeClr>
+          </a:lnRef>
+          <a:fillRef idx="1">
+            <a:schemeClr val="accent1"/>
+          </a:fillRef>
+          <a:effectRef idx="0">
+            <a:schemeClr val="accent1"/>
+          </a:effectRef>
+          <a:fontRef idx="minor">
+            <a:schemeClr val="lt1"/>
+          </a:fontRef>
+        </p:style>
+        <p:txBody>
+          <a:bodyPr rtlCol="0" anchor="ctr"/>
+          <a:lstStyle/>
+          <a:p>
+            <a:pPr algn="ctr"/>
+            <a:r>
+              <a:rPr lang="de-DE" sz="1000" b="1" dirty="0">
+                <a:solidFill>
+                  <a:schemeClr val="tx1"/>
+                </a:solidFill>
+              </a:rPr>
+              <a:t>hallo</a:t>
+            </a:r>
+            <a:endParaRPr lang="en-US" sz="1000" b="1" dirty="0">
+              <a:solidFill>
+                <a:schemeClr val="tx1"/>
+              </a:solidFill>
+            </a:endParaRPr>
+          </a:p>
+        </p:txBody>
+      </p:sp>
+      <p:sp>
+        <p:nvSpPr>
+          <p:cNvPr id="20" name="Rectangle 19">
+            <a:extLst>
+              <a:ext uri="{FF2B5EF4-FFF2-40B4-BE49-F238E27FC236}">
+                <a16:creationId xmlns:a16="http://schemas.microsoft.com/office/drawing/2014/main" id="{F9EC298E-4CD2-4835-ABDF-23203919A516}"/>
+              </a:ext>
+            </a:extLst>
+          </p:cNvPr>
+          <p:cNvSpPr/>
+          <p:nvPr/>
+        </p:nvSpPr>
+        <p:spPr>
+          <a:xfrm>
+            <a:off x="10390936" y="4195863"/>
+            <a:ext cx="737311" cy="205419"/>
+          </a:xfrm>
+          <a:prstGeom prst="rect">
+            <a:avLst/>
+          </a:prstGeom>
+          <a:solidFill>
+            <a:schemeClr val="tx1"/>
+          </a:solidFill>
+          <a:ln>
+            <a:solidFill>
+              <a:schemeClr val="tx1"/>
+            </a:solidFill>
+          </a:ln>
+        </p:spPr>
+        <p:style>
+          <a:lnRef idx="2">
+            <a:schemeClr val="accent1">
+              <a:shade val="50000"/>
+            </a:schemeClr>
+          </a:lnRef>
+          <a:fillRef idx="1">
+            <a:schemeClr val="accent1"/>
+          </a:fillRef>
+          <a:effectRef idx="0">
+            <a:schemeClr val="accent1"/>
+          </a:effectRef>
+          <a:fontRef idx="minor">
+            <a:schemeClr val="lt1"/>
+          </a:fontRef>
+        </p:style>
+        <p:txBody>
+          <a:bodyPr rtlCol="0" anchor="ctr"/>
+          <a:lstStyle/>
+          <a:p>
+            <a:pPr algn="ctr"/>
+            <a:r>
+              <a:rPr lang="de-DE" sz="1000" b="1" dirty="0">
+                <a:solidFill>
+                  <a:schemeClr val="tx1"/>
+                </a:solidFill>
+              </a:rPr>
+              <a:t>hallo</a:t>
+            </a:r>
+            <a:endParaRPr lang="en-US" sz="1000" b="1" dirty="0">
+              <a:solidFill>
+                <a:schemeClr val="tx1"/>
+              </a:solidFill>
+            </a:endParaRPr>
+          </a:p>
+        </p:txBody>
+      </p:sp>
+      <p:sp>
+        <p:nvSpPr>
+          <p:cNvPr id="21" name="Rectangle 20">
+            <a:extLst>
+              <a:ext uri="{FF2B5EF4-FFF2-40B4-BE49-F238E27FC236}">
+                <a16:creationId xmlns:a16="http://schemas.microsoft.com/office/drawing/2014/main" id="{049A6719-0D0C-4BEF-8513-D6D3ED9931AA}"/>
+              </a:ext>
+            </a:extLst>
+          </p:cNvPr>
+          <p:cNvSpPr/>
+          <p:nvPr/>
+        </p:nvSpPr>
+        <p:spPr>
+          <a:xfrm>
+            <a:off x="10510911" y="4140742"/>
+            <a:ext cx="737311" cy="205419"/>
+          </a:xfrm>
+          <a:prstGeom prst="rect">
+            <a:avLst/>
+          </a:prstGeom>
+          <a:solidFill>
+            <a:schemeClr val="tx1"/>
+          </a:solidFill>
+          <a:ln>
+            <a:solidFill>
+              <a:schemeClr val="tx1"/>
+            </a:solidFill>
+          </a:ln>
+        </p:spPr>
+        <p:style>
+          <a:lnRef idx="2">
+            <a:schemeClr val="accent1">
+              <a:shade val="50000"/>
+            </a:schemeClr>
+          </a:lnRef>
+          <a:fillRef idx="1">
+            <a:schemeClr val="accent1"/>
+          </a:fillRef>
+          <a:effectRef idx="0">
+            <a:schemeClr val="accent1"/>
+          </a:effectRef>
+          <a:fontRef idx="minor">
+            <a:schemeClr val="lt1"/>
+          </a:fontRef>
+        </p:style>
+        <p:txBody>
+          <a:bodyPr rtlCol="0" anchor="ctr"/>
+          <a:lstStyle/>
+          <a:p>
+            <a:pPr algn="ctr"/>
+            <a:r>
+              <a:rPr lang="de-DE" sz="1000" b="1" dirty="0">
+                <a:solidFill>
+                  <a:schemeClr val="tx1"/>
+                </a:solidFill>
+              </a:rPr>
+              <a:t>hallo</a:t>
+            </a:r>
+            <a:endParaRPr lang="en-US" sz="1000" b="1" dirty="0">
+              <a:solidFill>
+                <a:schemeClr val="tx1"/>
+              </a:solidFill>
+            </a:endParaRPr>
+          </a:p>
+        </p:txBody>
+      </p:sp>
+      <p:sp>
+        <p:nvSpPr>
+          <p:cNvPr id="22" name="Rectangle 21">
+            <a:extLst>
+              <a:ext uri="{FF2B5EF4-FFF2-40B4-BE49-F238E27FC236}">
+                <a16:creationId xmlns:a16="http://schemas.microsoft.com/office/drawing/2014/main" id="{EA3A1448-E0F6-46F8-A0B6-45D954077B29}"/>
+              </a:ext>
+            </a:extLst>
+          </p:cNvPr>
+          <p:cNvSpPr/>
+          <p:nvPr/>
+        </p:nvSpPr>
+        <p:spPr>
+          <a:xfrm>
+            <a:off x="9614715" y="3203637"/>
+            <a:ext cx="737311" cy="205419"/>
+          </a:xfrm>
+          <a:prstGeom prst="rect">
+            <a:avLst/>
+          </a:prstGeom>
+          <a:solidFill>
+            <a:schemeClr val="tx1"/>
+          </a:solidFill>
+          <a:ln>
+            <a:solidFill>
+              <a:schemeClr val="tx1"/>
+            </a:solidFill>
+          </a:ln>
+        </p:spPr>
+        <p:style>
+          <a:lnRef idx="2">
+            <a:schemeClr val="accent1">
+              <a:shade val="50000"/>
+            </a:schemeClr>
+          </a:lnRef>
+          <a:fillRef idx="1">
+            <a:schemeClr val="accent1"/>
+          </a:fillRef>
+          <a:effectRef idx="0">
+            <a:schemeClr val="accent1"/>
+          </a:effectRef>
+          <a:fontRef idx="minor">
+            <a:schemeClr val="lt1"/>
+          </a:fontRef>
+        </p:style>
+        <p:txBody>
+          <a:bodyPr rtlCol="0" anchor="ctr"/>
+          <a:lstStyle/>
+          <a:p>
+            <a:pPr algn="ctr"/>
+            <a:r>
+              <a:rPr lang="de-DE" sz="1000" b="1" dirty="0">
+                <a:solidFill>
+                  <a:schemeClr val="tx1"/>
+                </a:solidFill>
+              </a:rPr>
+              <a:t>hallo</a:t>
+            </a:r>
+            <a:endParaRPr lang="en-US" sz="1000" b="1" dirty="0">
+              <a:solidFill>
+                <a:schemeClr val="tx1"/>
+              </a:solidFill>
+            </a:endParaRPr>
           </a:p>
         </p:txBody>
       </p:sp>
     </p:spTree>
     <p:extLst>
       <p:ext uri="{BB962C8B-B14F-4D97-AF65-F5344CB8AC3E}">
-        <p14:creationId xmlns:p14="http://schemas.microsoft.com/office/powerpoint/2010/main" val="1186018037"/>
+        <p14:creationId xmlns:p14="http://schemas.microsoft.com/office/powerpoint/2010/main" val="2131925419"/>
       </p:ext>
     </p:extLst>
   </p:cSld>
@@ -6759,10 +9022,10 @@
       </p:grpSpPr>
       <p:sp>
         <p:nvSpPr>
-          <p:cNvPr id="2" name="Titel 1">
+          <p:cNvPr id="2" name="Title 1">
             <a:extLst>
               <a:ext uri="{FF2B5EF4-FFF2-40B4-BE49-F238E27FC236}">
-                <a16:creationId xmlns:a16="http://schemas.microsoft.com/office/drawing/2014/main" id="{CB50DA2B-AA7F-4B09-B3D5-FCB4B4D1371F}"/>
+                <a16:creationId xmlns:a16="http://schemas.microsoft.com/office/drawing/2014/main" id="{D18C0B0B-597D-45E9-9411-814C7D014DD2}"/>
               </a:ext>
             </a:extLst>
           </p:cNvPr>
@@ -6779,61 +9042,27 @@
           <a:lstStyle/>
           <a:p>
             <a:r>
-              <a:rPr lang="de-CH" dirty="0" err="1">
-                <a:solidFill>
-                  <a:srgbClr val="FF0000"/>
-                </a:solidFill>
-              </a:rPr>
-              <a:t>Evt</a:t>
-            </a:r>
-            <a:r>
-              <a:rPr lang="de-CH" dirty="0"/>
-              <a:t>: CMS Finder </a:t>
-            </a:r>
-            <a:r>
-              <a:rPr lang="de-CH" dirty="0" err="1"/>
-              <a:t>Wp-admin</a:t>
-            </a:r>
-            <a:r>
-              <a:rPr lang="de-CH" dirty="0"/>
-              <a:t> </a:t>
-            </a:r>
-            <a:r>
-              <a:rPr lang="de-CH" dirty="0" err="1"/>
-              <a:t>acess</a:t>
-            </a:r>
-            <a:br>
-              <a:rPr lang="de-CH" dirty="0"/>
-            </a:br>
-            <a:r>
-              <a:rPr lang="de-CH" dirty="0"/>
-              <a:t>in </a:t>
-            </a:r>
-            <a:r>
-              <a:rPr lang="de-CH" dirty="0" err="1"/>
-              <a:t>deept</a:t>
-            </a:r>
-            <a:r>
-              <a:rPr lang="de-CH" dirty="0"/>
-              <a:t>/</a:t>
-            </a:r>
-            <a:r>
-              <a:rPr lang="de-CH" dirty="0" err="1"/>
-              <a:t>bzw</a:t>
-            </a:r>
-            <a:r>
-              <a:rPr lang="de-CH" dirty="0"/>
-              <a:t> code</a:t>
-            </a:r>
-          </a:p>
-        </p:txBody>
-      </p:sp>
-      <p:sp>
-        <p:nvSpPr>
-          <p:cNvPr id="3" name="Inhaltsplatzhalter 2">
+              <a:rPr lang="de-DE" dirty="0"/>
+              <a:t>Was ist ein </a:t>
+            </a:r>
+            <a:r>
+              <a:rPr lang="de-DE" dirty="0" err="1"/>
+              <a:t>Document</a:t>
+            </a:r>
+            <a:r>
+              <a:rPr lang="de-DE" dirty="0"/>
+              <a:t>?</a:t>
+            </a:r>
+            <a:endParaRPr lang="en-US" dirty="0"/>
+          </a:p>
+        </p:txBody>
+      </p:sp>
+      <p:sp>
+        <p:nvSpPr>
+          <p:cNvPr id="3" name="Content Placeholder 2">
             <a:extLst>
               <a:ext uri="{FF2B5EF4-FFF2-40B4-BE49-F238E27FC236}">
-                <a16:creationId xmlns:a16="http://schemas.microsoft.com/office/drawing/2014/main" id="{250077A3-CEB6-4E4B-8F1D-99756E615CC2}"/>
+                <a16:creationId xmlns:a16="http://schemas.microsoft.com/office/drawing/2014/main" id="{97C7A965-6E66-4020-A5A1-34C6FFBD3EB5}"/>
               </a:ext>
             </a:extLst>
           </p:cNvPr>
@@ -6849,14 +9078,84 @@
           <a:bodyPr/>
           <a:lstStyle/>
           <a:p>
-            <a:endParaRPr lang="de-CH" dirty="0"/>
+            <a:r>
+              <a:rPr lang="de-DE" dirty="0" err="1"/>
+              <a:t>Object</a:t>
+            </a:r>
+            <a:r>
+              <a:rPr lang="de-DE" dirty="0"/>
+              <a:t> der Java </a:t>
+            </a:r>
+            <a:r>
+              <a:rPr lang="de-DE" dirty="0" err="1"/>
+              <a:t>Jsoup</a:t>
+            </a:r>
+            <a:r>
+              <a:rPr lang="de-DE" dirty="0"/>
+              <a:t> </a:t>
+            </a:r>
+            <a:r>
+              <a:rPr lang="de-DE" dirty="0" err="1"/>
+              <a:t>library</a:t>
+            </a:r>
+            <a:endParaRPr lang="de-DE" dirty="0"/>
+          </a:p>
+          <a:p>
+            <a:r>
+              <a:rPr lang="de-DE" dirty="0"/>
+              <a:t>Beinhaltet Informationen zu jedem URL:</a:t>
+            </a:r>
+          </a:p>
+          <a:p>
+            <a:pPr lvl="1"/>
+            <a:r>
+              <a:rPr lang="de-DE" dirty="0"/>
+              <a:t>Root URL</a:t>
+            </a:r>
+          </a:p>
+          <a:p>
+            <a:pPr lvl="1"/>
+            <a:r>
+              <a:rPr lang="de-DE" dirty="0"/>
+              <a:t>HTML</a:t>
+            </a:r>
+          </a:p>
+          <a:p>
+            <a:pPr lvl="1"/>
+            <a:r>
+              <a:rPr lang="de-DE" dirty="0"/>
+              <a:t>HTML </a:t>
+            </a:r>
+            <a:r>
+              <a:rPr lang="de-DE" dirty="0" err="1"/>
+              <a:t>headers</a:t>
+            </a:r>
+            <a:endParaRPr lang="de-DE" dirty="0"/>
+          </a:p>
+          <a:p>
+            <a:pPr lvl="1"/>
+            <a:r>
+              <a:rPr lang="de-DE" dirty="0"/>
+              <a:t>Und vieles mehr </a:t>
+            </a:r>
+            <a:r>
+              <a:rPr lang="de-DE" dirty="0">
+                <a:sym typeface="Wingdings" panose="05000000000000000000" pitchFamily="2" charset="2"/>
+              </a:rPr>
+              <a:t></a:t>
+            </a:r>
+            <a:endParaRPr lang="de-DE" dirty="0"/>
+          </a:p>
+          <a:p>
+            <a:pPr lvl="1"/>
+            <a:endParaRPr lang="en-US" dirty="0"/>
           </a:p>
         </p:txBody>
       </p:sp>
     </p:spTree>
     <p:extLst>
       <p:ext uri="{BB962C8B-B14F-4D97-AF65-F5344CB8AC3E}">
-        <p14:creationId xmlns:p14="http://schemas.microsoft.com/office/powerpoint/2010/main" val="3044749818"/>
+        <p14:creationId xmlns:p14="http://schemas.microsoft.com/office/powerpoint/2010/main" val="979307872"/>
       </p:ext>
     </p:extLst>
   </p:cSld>
@@ -6885,10 +9184,10 @@
       </p:grpSpPr>
       <p:sp>
         <p:nvSpPr>
-          <p:cNvPr id="2" name="Titel 1">
+          <p:cNvPr id="4" name="Titel 3">
             <a:extLst>
               <a:ext uri="{FF2B5EF4-FFF2-40B4-BE49-F238E27FC236}">
-                <a16:creationId xmlns:a16="http://schemas.microsoft.com/office/drawing/2014/main" id="{E88614B9-1B39-4BE7-BA4C-E4C131934D18}"/>
+                <a16:creationId xmlns:a16="http://schemas.microsoft.com/office/drawing/2014/main" id="{7CB9951C-7B91-4A10-A02E-31593867D281}"/>
               </a:ext>
             </a:extLst>
           </p:cNvPr>
@@ -6899,47 +9198,28 @@
             <p:ph type="title"/>
           </p:nvPr>
         </p:nvSpPr>
-        <p:spPr/>
+        <p:spPr>
+          <a:xfrm>
+            <a:off x="1115342" y="1807849"/>
+            <a:ext cx="9404723" cy="1400530"/>
+          </a:xfrm>
+        </p:spPr>
         <p:txBody>
           <a:bodyPr/>
           <a:lstStyle/>
           <a:p>
-            <a:r>
-              <a:rPr lang="de-CH" dirty="0"/>
-              <a:t>Sicherheit von CMS Installationen</a:t>
-            </a:r>
-          </a:p>
-        </p:txBody>
-      </p:sp>
-      <p:sp>
-        <p:nvSpPr>
-          <p:cNvPr id="4" name="Textplatzhalter 3">
-            <a:extLst>
-              <a:ext uri="{FF2B5EF4-FFF2-40B4-BE49-F238E27FC236}">
-                <a16:creationId xmlns:a16="http://schemas.microsoft.com/office/drawing/2014/main" id="{2C87B7A2-FF39-4E52-BBEA-C8EBD242A7D1}"/>
-              </a:ext>
-            </a:extLst>
-          </p:cNvPr>
-          <p:cNvSpPr>
-            <a:spLocks noGrp="1"/>
-          </p:cNvSpPr>
-          <p:nvPr>
-            <p:ph type="body" idx="1"/>
-          </p:nvPr>
-        </p:nvSpPr>
-        <p:spPr/>
-        <p:txBody>
-          <a:bodyPr/>
-          <a:lstStyle/>
-          <a:p>
-            <a:endParaRPr lang="de-CH"/>
+            <a:pPr algn="ctr"/>
+            <a:r>
+              <a:rPr lang="de-CH" sz="6000" dirty="0"/>
+              <a:t>Sicherheitslücken mit HTML identifizieren, Live Demo:</a:t>
+            </a:r>
           </a:p>
         </p:txBody>
       </p:sp>
     </p:spTree>
     <p:extLst>
       <p:ext uri="{BB962C8B-B14F-4D97-AF65-F5344CB8AC3E}">
-        <p14:creationId xmlns:p14="http://schemas.microsoft.com/office/powerpoint/2010/main" val="2586668533"/>
+        <p14:creationId xmlns:p14="http://schemas.microsoft.com/office/powerpoint/2010/main" val="113617077"/>
       </p:ext>
     </p:extLst>
   </p:cSld>
@@ -6968,10 +9248,10 @@
       </p:grpSpPr>
       <p:sp>
         <p:nvSpPr>
-          <p:cNvPr id="2" name="Titel 1">
+          <p:cNvPr id="2" name="Title 1">
             <a:extLst>
               <a:ext uri="{FF2B5EF4-FFF2-40B4-BE49-F238E27FC236}">
-                <a16:creationId xmlns:a16="http://schemas.microsoft.com/office/drawing/2014/main" id="{DCA0B1A3-EF42-4D47-84A0-F83C71322160}"/>
+                <a16:creationId xmlns:a16="http://schemas.microsoft.com/office/drawing/2014/main" id="{BCB7A39C-A36D-48E9-8C96-3D6475A2A8FD}"/>
               </a:ext>
             </a:extLst>
           </p:cNvPr>
@@ -6988,18 +9268,19 @@
           <a:lstStyle/>
           <a:p>
             <a:r>
-              <a:rPr lang="de-CH" dirty="0"/>
-              <a:t>Welches CMS wird wie oft genutzt?</a:t>
-            </a:r>
-          </a:p>
-        </p:txBody>
-      </p:sp>
-      <p:sp>
-        <p:nvSpPr>
-          <p:cNvPr id="3" name="Inhaltsplatzhalter 2">
+              <a:rPr lang="de-DE" dirty="0"/>
+              <a:t>Unsere Ergebnisse:</a:t>
+            </a:r>
+            <a:endParaRPr lang="en-US" dirty="0"/>
+          </a:p>
+        </p:txBody>
+      </p:sp>
+      <p:sp>
+        <p:nvSpPr>
+          <p:cNvPr id="3" name="Content Placeholder 2">
             <a:extLst>
               <a:ext uri="{FF2B5EF4-FFF2-40B4-BE49-F238E27FC236}">
-                <a16:creationId xmlns:a16="http://schemas.microsoft.com/office/drawing/2014/main" id="{9440D8B8-64F4-4E20-BF60-21675D5F48A3}"/>
+                <a16:creationId xmlns:a16="http://schemas.microsoft.com/office/drawing/2014/main" id="{5C1001F0-B5F5-4DCD-8165-12BD3E2CDD04}"/>
               </a:ext>
             </a:extLst>
           </p:cNvPr>
@@ -7016,20 +9297,116 @@
           <a:lstStyle/>
           <a:p>
             <a:r>
-              <a:rPr lang="de-CH" dirty="0">
-                <a:solidFill>
-                  <a:srgbClr val="FF0000"/>
-                </a:solidFill>
-              </a:rPr>
-              <a:t>Statistik hier</a:t>
-            </a:r>
+              <a:rPr lang="de-DE" dirty="0"/>
+              <a:t>Ca. 200000 Websites </a:t>
+            </a:r>
+            <a:r>
+              <a:rPr lang="de-DE" dirty="0" err="1"/>
+              <a:t>gecrawled</a:t>
+            </a:r>
+            <a:endParaRPr lang="de-DE" dirty="0"/>
+          </a:p>
+          <a:p>
+            <a:r>
+              <a:rPr lang="de-DE" dirty="0"/>
+              <a:t>Soviel CMS nicht </a:t>
+            </a:r>
+            <a:r>
+              <a:rPr lang="de-DE" dirty="0" err="1"/>
+              <a:t>detected</a:t>
+            </a:r>
+            <a:endParaRPr lang="de-DE" dirty="0"/>
+          </a:p>
+          <a:p>
+            <a:r>
+              <a:rPr lang="de-DE" dirty="0"/>
+              <a:t>Soviel CMSVER nicht </a:t>
+            </a:r>
+            <a:r>
+              <a:rPr lang="de-DE" dirty="0" err="1"/>
+              <a:t>detected</a:t>
+            </a:r>
+            <a:endParaRPr lang="de-DE" dirty="0"/>
+          </a:p>
+          <a:p>
+            <a:r>
+              <a:rPr lang="de-DE" dirty="0"/>
+              <a:t>Soviel mit </a:t>
+            </a:r>
+            <a:r>
+              <a:rPr lang="de-DE" dirty="0" err="1"/>
+              <a:t>security</a:t>
+            </a:r>
+            <a:r>
+              <a:rPr lang="de-DE" dirty="0"/>
+              <a:t> </a:t>
+            </a:r>
+            <a:r>
+              <a:rPr lang="de-DE" dirty="0" err="1"/>
+              <a:t>rating</a:t>
+            </a:r>
+            <a:r>
+              <a:rPr lang="de-DE" dirty="0"/>
+              <a:t> &gt;=10</a:t>
+            </a:r>
+          </a:p>
+          <a:p>
+            <a:r>
+              <a:rPr lang="de-DE" dirty="0" err="1"/>
+              <a:t>CMSVer</a:t>
+            </a:r>
+            <a:r>
+              <a:rPr lang="de-DE" dirty="0"/>
+              <a:t> </a:t>
+            </a:r>
+            <a:r>
+              <a:rPr lang="de-DE" dirty="0" err="1"/>
+              <a:t>detected</a:t>
+            </a:r>
+            <a:endParaRPr lang="de-DE" dirty="0"/>
+          </a:p>
+          <a:p>
+            <a:r>
+              <a:rPr lang="de-DE" dirty="0"/>
+              <a:t>CMS </a:t>
+            </a:r>
+            <a:r>
+              <a:rPr lang="de-DE" dirty="0" err="1"/>
+              <a:t>detected</a:t>
+            </a:r>
+            <a:endParaRPr lang="de-DE" dirty="0"/>
+          </a:p>
+          <a:p>
+            <a:r>
+              <a:rPr lang="de-DE" dirty="0"/>
+              <a:t>Etc. (vielleicht </a:t>
+            </a:r>
+            <a:r>
+              <a:rPr lang="de-DE" dirty="0" err="1"/>
+              <a:t>kuchen</a:t>
+            </a:r>
+            <a:r>
+              <a:rPr lang="de-DE" dirty="0"/>
+              <a:t> </a:t>
+            </a:r>
+            <a:r>
+              <a:rPr lang="de-DE" dirty="0" err="1"/>
+              <a:t>modell</a:t>
+            </a:r>
+            <a:r>
+              <a:rPr lang="de-DE" dirty="0"/>
+              <a:t> der CMS)</a:t>
+            </a:r>
+          </a:p>
+          <a:p>
+            <a:endParaRPr lang="en-US" dirty="0"/>
           </a:p>
         </p:txBody>
       </p:sp>
     </p:spTree>
     <p:extLst>
       <p:ext uri="{BB962C8B-B14F-4D97-AF65-F5344CB8AC3E}">
-        <p14:creationId xmlns:p14="http://schemas.microsoft.com/office/powerpoint/2010/main" val="123932608"/>
+        <p14:creationId xmlns:p14="http://schemas.microsoft.com/office/powerpoint/2010/main" val="242295462"/>
       </p:ext>
     </p:extLst>
   </p:cSld>
@@ -7119,7 +9496,141 @@
             </a:r>
           </a:p>
           <a:p>
+            <a:r>
+              <a:rPr lang="de-CH" dirty="0">
+                <a:solidFill>
+                  <a:srgbClr val="FF0000"/>
+                </a:solidFill>
+              </a:rPr>
+              <a:t>Anzahl 3.0 / 3. irgendwas</a:t>
+            </a:r>
+          </a:p>
+          <a:p>
+            <a:r>
+              <a:rPr lang="de-CH" dirty="0">
+                <a:solidFill>
+                  <a:srgbClr val="FF0000"/>
+                </a:solidFill>
+              </a:rPr>
+              <a:t>Anzahl 2.0 /2. irgendwas</a:t>
+            </a:r>
+          </a:p>
+          <a:p>
+            <a:r>
+              <a:rPr lang="de-CH" dirty="0">
+                <a:solidFill>
+                  <a:srgbClr val="FF0000"/>
+                </a:solidFill>
+              </a:rPr>
+              <a:t>Anzahl 4.0 / 4. irgendwas</a:t>
+            </a:r>
+          </a:p>
+          <a:p>
+            <a:r>
+              <a:rPr lang="de-CH" dirty="0">
+                <a:solidFill>
+                  <a:srgbClr val="FF0000"/>
+                </a:solidFill>
+              </a:rPr>
+              <a:t>Anzahl 5.0 / 5. irgendwas</a:t>
+            </a:r>
+          </a:p>
+          <a:p>
+            <a:endParaRPr lang="de-CH" dirty="0">
+              <a:solidFill>
+                <a:srgbClr val="FF0000"/>
+              </a:solidFill>
+            </a:endParaRPr>
+          </a:p>
+          <a:p>
+            <a:endParaRPr lang="de-CH" dirty="0">
+              <a:solidFill>
+                <a:srgbClr val="FF0000"/>
+              </a:solidFill>
+            </a:endParaRPr>
+          </a:p>
+          <a:p>
             <a:endParaRPr lang="de-CH" dirty="0"/>
+          </a:p>
+        </p:txBody>
+      </p:sp>
+      <p:pic>
+        <p:nvPicPr>
+          <p:cNvPr id="4" name="Content Placeholder 3">
+            <a:extLst>
+              <a:ext uri="{FF2B5EF4-FFF2-40B4-BE49-F238E27FC236}">
+                <a16:creationId xmlns:a16="http://schemas.microsoft.com/office/drawing/2014/main" id="{E4F5231E-79D2-462C-8251-41A7BD5F033C}"/>
+              </a:ext>
+            </a:extLst>
+          </p:cNvPr>
+          <p:cNvPicPr>
+            <a:picLocks noChangeAspect="1"/>
+          </p:cNvPicPr>
+          <p:nvPr/>
+        </p:nvPicPr>
+        <p:blipFill>
+          <a:blip r:embed="rId2"/>
+          <a:stretch>
+            <a:fillRect/>
+          </a:stretch>
+        </p:blipFill>
+        <p:spPr>
+          <a:xfrm>
+            <a:off x="1044947" y="3719127"/>
+            <a:ext cx="8947150" cy="2419207"/>
+          </a:xfrm>
+          <a:prstGeom prst="rect">
+            <a:avLst/>
+          </a:prstGeom>
+        </p:spPr>
+      </p:pic>
+      <p:sp>
+        <p:nvSpPr>
+          <p:cNvPr id="5" name="Rectangle 4">
+            <a:extLst>
+              <a:ext uri="{FF2B5EF4-FFF2-40B4-BE49-F238E27FC236}">
+                <a16:creationId xmlns:a16="http://schemas.microsoft.com/office/drawing/2014/main" id="{2049F06D-10BE-4473-A8A8-99977BE347CF}"/>
+              </a:ext>
+            </a:extLst>
+          </p:cNvPr>
+          <p:cNvSpPr/>
+          <p:nvPr/>
+        </p:nvSpPr>
+        <p:spPr>
+          <a:xfrm>
+            <a:off x="3467911" y="6059126"/>
+            <a:ext cx="5085944" cy="633411"/>
+          </a:xfrm>
+          <a:prstGeom prst="rect">
+            <a:avLst/>
+          </a:prstGeom>
+        </p:spPr>
+        <p:style>
+          <a:lnRef idx="2">
+            <a:schemeClr val="accent1">
+              <a:shade val="50000"/>
+            </a:schemeClr>
+          </a:lnRef>
+          <a:fillRef idx="1">
+            <a:schemeClr val="accent1"/>
+          </a:fillRef>
+          <a:effectRef idx="0">
+            <a:schemeClr val="accent1"/>
+          </a:effectRef>
+          <a:fontRef idx="minor">
+            <a:schemeClr val="lt1"/>
+          </a:fontRef>
+        </p:style>
+        <p:txBody>
+          <a:bodyPr rtlCol="0" anchor="ctr"/>
+          <a:lstStyle/>
+          <a:p>
+            <a:pPr algn="ctr"/>
+            <a:r>
+              <a:rPr lang="de-DE" dirty="0"/>
+              <a:t>Source: (wpwhitesecurity.com 12.04.2019)</a:t>
+            </a:r>
+            <a:endParaRPr lang="en-US" dirty="0"/>
           </a:p>
         </p:txBody>
       </p:sp>
@@ -7155,10 +9666,10 @@
       </p:grpSpPr>
       <p:sp>
         <p:nvSpPr>
-          <p:cNvPr id="2" name="Titel 1">
+          <p:cNvPr id="2" name="Title 1">
             <a:extLst>
               <a:ext uri="{FF2B5EF4-FFF2-40B4-BE49-F238E27FC236}">
-                <a16:creationId xmlns:a16="http://schemas.microsoft.com/office/drawing/2014/main" id="{21FC5B12-DB84-4689-99AC-B2D57E4EAD24}"/>
+                <a16:creationId xmlns:a16="http://schemas.microsoft.com/office/drawing/2014/main" id="{C12CC94C-FDE4-410F-986E-E08D3B77EFA5}"/>
               </a:ext>
             </a:extLst>
           </p:cNvPr>
@@ -7175,18 +9686,23 @@
           <a:lstStyle/>
           <a:p>
             <a:r>
-              <a:rPr lang="de-CH" dirty="0"/>
-              <a:t>Sicherheitsrisiken älterer WP-Versionen</a:t>
-            </a:r>
-          </a:p>
-        </p:txBody>
-      </p:sp>
-      <p:sp>
-        <p:nvSpPr>
-          <p:cNvPr id="3" name="Inhaltsplatzhalter 2">
+              <a:rPr lang="de-DE" dirty="0" err="1"/>
+              <a:t>Wordpress</a:t>
+            </a:r>
+            <a:r>
+              <a:rPr lang="de-DE" dirty="0"/>
+              <a:t> gefährliche Plugins</a:t>
+            </a:r>
+            <a:endParaRPr lang="en-US" dirty="0"/>
+          </a:p>
+        </p:txBody>
+      </p:sp>
+      <p:sp>
+        <p:nvSpPr>
+          <p:cNvPr id="6" name="Content Placeholder 5">
             <a:extLst>
               <a:ext uri="{FF2B5EF4-FFF2-40B4-BE49-F238E27FC236}">
-                <a16:creationId xmlns:a16="http://schemas.microsoft.com/office/drawing/2014/main" id="{0E86ECC7-C685-4D78-BF08-635E4BCDCDDB}"/>
+                <a16:creationId xmlns:a16="http://schemas.microsoft.com/office/drawing/2014/main" id="{984D27E1-40E6-4911-BFFB-84473D9AA097}"/>
               </a:ext>
             </a:extLst>
           </p:cNvPr>
@@ -7202,14 +9718,158 @@
           <a:bodyPr/>
           <a:lstStyle/>
           <a:p>
-            <a:endParaRPr lang="de-CH" dirty="0"/>
+            <a:r>
+              <a:rPr lang="de-DE" dirty="0" err="1"/>
+              <a:t>Tested</a:t>
+            </a:r>
+            <a:r>
+              <a:rPr lang="de-DE" dirty="0"/>
+              <a:t> </a:t>
+            </a:r>
+            <a:r>
+              <a:rPr lang="de-DE" dirty="0" err="1"/>
+              <a:t>for</a:t>
+            </a:r>
+            <a:r>
+              <a:rPr lang="de-DE" dirty="0"/>
+              <a:t>: WooCommerce (19 </a:t>
+            </a:r>
+            <a:r>
+              <a:rPr lang="de-DE" dirty="0" err="1"/>
+              <a:t>known</a:t>
+            </a:r>
+            <a:r>
+              <a:rPr lang="de-DE" dirty="0"/>
+              <a:t> </a:t>
+            </a:r>
+            <a:r>
+              <a:rPr lang="de-DE" dirty="0" err="1"/>
+              <a:t>vulerabilities</a:t>
+            </a:r>
+            <a:r>
+              <a:rPr lang="de-DE" dirty="0"/>
+              <a:t>), </a:t>
+            </a:r>
+            <a:r>
+              <a:rPr lang="de-DE" dirty="0" err="1"/>
+              <a:t>Yoast</a:t>
+            </a:r>
+            <a:r>
+              <a:rPr lang="de-DE" dirty="0"/>
+              <a:t> SEO (10 </a:t>
+            </a:r>
+            <a:r>
+              <a:rPr lang="de-DE" dirty="0" err="1"/>
+              <a:t>known</a:t>
+            </a:r>
+            <a:r>
+              <a:rPr lang="de-DE" dirty="0"/>
+              <a:t> </a:t>
+            </a:r>
+            <a:r>
+              <a:rPr lang="de-DE" dirty="0" err="1"/>
+              <a:t>vulerabilities</a:t>
+            </a:r>
+            <a:r>
+              <a:rPr lang="de-DE" dirty="0"/>
+              <a:t>), </a:t>
+            </a:r>
+            <a:r>
+              <a:rPr lang="de-DE" dirty="0" err="1"/>
+              <a:t>redirection</a:t>
+            </a:r>
+            <a:r>
+              <a:rPr lang="de-DE" dirty="0"/>
+              <a:t> (</a:t>
+            </a:r>
+            <a:r>
+              <a:rPr lang="de-DE" dirty="0" err="1"/>
+              <a:t>bad</a:t>
+            </a:r>
+            <a:r>
+              <a:rPr lang="de-DE" dirty="0"/>
+              <a:t> </a:t>
+            </a:r>
+            <a:r>
+              <a:rPr lang="de-DE" dirty="0" err="1"/>
+              <a:t>history</a:t>
+            </a:r>
+            <a:r>
+              <a:rPr lang="de-DE" dirty="0"/>
+              <a:t> </a:t>
+            </a:r>
+            <a:r>
+              <a:rPr lang="de-DE" dirty="0" err="1"/>
+              <a:t>of</a:t>
+            </a:r>
+            <a:r>
+              <a:rPr lang="de-DE" dirty="0"/>
+              <a:t> </a:t>
+            </a:r>
+            <a:r>
+              <a:rPr lang="de-DE" dirty="0" err="1"/>
+              <a:t>vulnerabilities</a:t>
+            </a:r>
+            <a:r>
+              <a:rPr lang="de-DE" dirty="0"/>
+              <a:t>), </a:t>
+            </a:r>
+            <a:r>
+              <a:rPr lang="de-DE" dirty="0" err="1"/>
+              <a:t>NextGen</a:t>
+            </a:r>
+            <a:r>
+              <a:rPr lang="de-DE" dirty="0"/>
+              <a:t> Gallery (14 </a:t>
+            </a:r>
+            <a:r>
+              <a:rPr lang="de-DE" dirty="0" err="1"/>
+              <a:t>security</a:t>
+            </a:r>
+            <a:r>
+              <a:rPr lang="de-DE" dirty="0"/>
+              <a:t> </a:t>
+            </a:r>
+            <a:r>
+              <a:rPr lang="de-DE" dirty="0" err="1"/>
+              <a:t>advisories</a:t>
+            </a:r>
+            <a:r>
+              <a:rPr lang="de-DE" dirty="0"/>
+              <a:t>), ContactForm7 (</a:t>
+            </a:r>
+            <a:r>
+              <a:rPr lang="de-DE" dirty="0" err="1"/>
+              <a:t>privelidge</a:t>
+            </a:r>
+            <a:r>
+              <a:rPr lang="de-DE" dirty="0"/>
+              <a:t> </a:t>
+            </a:r>
+            <a:r>
+              <a:rPr lang="de-DE" dirty="0" err="1"/>
+              <a:t>escalation</a:t>
+            </a:r>
+            <a:r>
+              <a:rPr lang="de-DE" dirty="0"/>
+              <a:t> </a:t>
+            </a:r>
+            <a:r>
+              <a:rPr lang="de-DE" dirty="0" err="1"/>
+              <a:t>flaw</a:t>
+            </a:r>
+            <a:r>
+              <a:rPr lang="de-DE" dirty="0"/>
+              <a:t>) (Source: immuniweb.com)</a:t>
+            </a:r>
+            <a:endParaRPr lang="en-US" dirty="0"/>
           </a:p>
         </p:txBody>
       </p:sp>
     </p:spTree>
     <p:extLst>
       <p:ext uri="{BB962C8B-B14F-4D97-AF65-F5344CB8AC3E}">
-        <p14:creationId xmlns:p14="http://schemas.microsoft.com/office/powerpoint/2010/main" val="2335740317"/>
+        <p14:creationId xmlns:p14="http://schemas.microsoft.com/office/powerpoint/2010/main" val="3342584468"/>
       </p:ext>
     </p:extLst>
   </p:cSld>
@@ -7482,4 +10142,299 @@
     </a:ext>
   </a:extLst>
 </a:theme>
+</file>
+
+<file path=ppt/theme/theme2.xml><?xml version="1.0" encoding="utf-8"?>
+<a:theme xmlns:a="http://schemas.openxmlformats.org/drawingml/2006/main" name="Office Theme">
+  <a:themeElements>
+    <a:clrScheme name="Office">
+      <a:dk1>
+        <a:sysClr val="windowText" lastClr="000000"/>
+      </a:dk1>
+      <a:lt1>
+        <a:sysClr val="window" lastClr="FFFFFF"/>
+      </a:lt1>
+      <a:dk2>
+        <a:srgbClr val="44546A"/>
+      </a:dk2>
+      <a:lt2>
+        <a:srgbClr val="E7E6E6"/>
+      </a:lt2>
+      <a:accent1>
+        <a:srgbClr val="4472C4"/>
+      </a:accent1>
+      <a:accent2>
+        <a:srgbClr val="ED7D31"/>
+      </a:accent2>
+      <a:accent3>
+        <a:srgbClr val="A5A5A5"/>
+      </a:accent3>
+      <a:accent4>
+        <a:srgbClr val="FFC000"/>
+      </a:accent4>
+      <a:accent5>
+        <a:srgbClr val="5B9BD5"/>
+      </a:accent5>
+      <a:accent6>
+        <a:srgbClr val="70AD47"/>
+      </a:accent6>
+      <a:hlink>
+        <a:srgbClr val="0563C1"/>
+      </a:hlink>
+      <a:folHlink>
+        <a:srgbClr val="954F72"/>
+      </a:folHlink>
+    </a:clrScheme>
+    <a:fontScheme name="Office">
+      <a:majorFont>
+        <a:latin typeface="Calibri Light" panose="020F0302020204030204"/>
+        <a:ea typeface=""/>
+        <a:cs typeface=""/>
+        <a:font script="Jpan" typeface="游ゴシック Light"/>
+        <a:font script="Hang" typeface="맑은 고딕"/>
+        <a:font script="Hans" typeface="等线 Light"/>
+        <a:font script="Hant" typeface="新細明體"/>
+        <a:font script="Arab" typeface="Times New Roman"/>
+        <a:font script="Hebr" typeface="Times New Roman"/>
+        <a:font script="Thai" typeface="Angsana New"/>
+        <a:font script="Ethi" typeface="Nyala"/>
+        <a:font script="Beng" typeface="Vrinda"/>
+        <a:font script="Gujr" typeface="Shruti"/>
+        <a:font script="Khmr" typeface="MoolBoran"/>
+        <a:font script="Knda" typeface="Tunga"/>
+        <a:font script="Guru" typeface="Raavi"/>
+        <a:font script="Cans" typeface="Euphemia"/>
+        <a:font script="Cher" typeface="Plantagenet Cherokee"/>
+        <a:font script="Yiii" typeface="Microsoft Yi Baiti"/>
+        <a:font script="Tibt" typeface="Microsoft Himalaya"/>
+        <a:font script="Thaa" typeface="MV Boli"/>
+        <a:font script="Deva" typeface="Mangal"/>
+        <a:font script="Telu" typeface="Gautami"/>
+        <a:font script="Taml" typeface="Latha"/>
+        <a:font script="Syrc" typeface="Estrangelo Edessa"/>
+        <a:font script="Orya" typeface="Kalinga"/>
+        <a:font script="Mlym" typeface="Kartika"/>
+        <a:font script="Laoo" typeface="DokChampa"/>
+        <a:font script="Sinh" typeface="Iskoola Pota"/>
+        <a:font script="Mong" typeface="Mongolian Baiti"/>
+        <a:font script="Viet" typeface="Times New Roman"/>
+        <a:font script="Uigh" typeface="Microsoft Uighur"/>
+        <a:font script="Geor" typeface="Sylfaen"/>
+        <a:font script="Armn" typeface="Arial"/>
+        <a:font script="Bugi" typeface="Leelawadee UI"/>
+        <a:font script="Bopo" typeface="Microsoft JhengHei"/>
+        <a:font script="Java" typeface="Javanese Text"/>
+        <a:font script="Lisu" typeface="Segoe UI"/>
+        <a:font script="Mymr" typeface="Myanmar Text"/>
+        <a:font script="Nkoo" typeface="Ebrima"/>
+        <a:font script="Olck" typeface="Nirmala UI"/>
+        <a:font script="Osma" typeface="Ebrima"/>
+        <a:font script="Phag" typeface="Phagspa"/>
+        <a:font script="Syrn" typeface="Estrangelo Edessa"/>
+        <a:font script="Syrj" typeface="Estrangelo Edessa"/>
+        <a:font script="Syre" typeface="Estrangelo Edessa"/>
+        <a:font script="Sora" typeface="Nirmala UI"/>
+        <a:font script="Tale" typeface="Microsoft Tai Le"/>
+        <a:font script="Talu" typeface="Microsoft New Tai Lue"/>
+        <a:font script="Tfng" typeface="Ebrima"/>
+      </a:majorFont>
+      <a:minorFont>
+        <a:latin typeface="Calibri" panose="020F0502020204030204"/>
+        <a:ea typeface=""/>
+        <a:cs typeface=""/>
+        <a:font script="Jpan" typeface="游ゴシック"/>
+        <a:font script="Hang" typeface="맑은 고딕"/>
+        <a:font script="Hans" typeface="等线"/>
+        <a:font script="Hant" typeface="新細明體"/>
+        <a:font script="Arab" typeface="Arial"/>
+        <a:font script="Hebr" typeface="Arial"/>
+        <a:font script="Thai" typeface="Cordia New"/>
+        <a:font script="Ethi" typeface="Nyala"/>
+        <a:font script="Beng" typeface="Vrinda"/>
+        <a:font script="Gujr" typeface="Shruti"/>
+        <a:font script="Khmr" typeface="DaunPenh"/>
+        <a:font script="Knda" typeface="Tunga"/>
+        <a:font script="Guru" typeface="Raavi"/>
+        <a:font script="Cans" typeface="Euphemia"/>
+        <a:font script="Cher" typeface="Plantagenet Cherokee"/>
+        <a:font script="Yiii" typeface="Microsoft Yi Baiti"/>
+        <a:font script="Tibt" typeface="Microsoft Himalaya"/>
+        <a:font script="Thaa" typeface="MV Boli"/>
+        <a:font script="Deva" typeface="Mangal"/>
+        <a:font script="Telu" typeface="Gautami"/>
+        <a:font script="Taml" typeface="Latha"/>
+        <a:font script="Syrc" typeface="Estrangelo Edessa"/>
+        <a:font script="Orya" typeface="Kalinga"/>
+        <a:font script="Mlym" typeface="Kartika"/>
+        <a:font script="Laoo" typeface="DokChampa"/>
+        <a:font script="Sinh" typeface="Iskoola Pota"/>
+        <a:font script="Mong" typeface="Mongolian Baiti"/>
+        <a:font script="Viet" typeface="Arial"/>
+        <a:font script="Uigh" typeface="Microsoft Uighur"/>
+        <a:font script="Geor" typeface="Sylfaen"/>
+        <a:font script="Armn" typeface="Arial"/>
+        <a:font script="Bugi" typeface="Leelawadee UI"/>
+        <a:font script="Bopo" typeface="Microsoft JhengHei"/>
+        <a:font script="Java" typeface="Javanese Text"/>
+        <a:font script="Lisu" typeface="Segoe UI"/>
+        <a:font script="Mymr" typeface="Myanmar Text"/>
+        <a:font script="Nkoo" typeface="Ebrima"/>
+        <a:font script="Olck" typeface="Nirmala UI"/>
+        <a:font script="Osma" typeface="Ebrima"/>
+        <a:font script="Phag" typeface="Phagspa"/>
+        <a:font script="Syrn" typeface="Estrangelo Edessa"/>
+        <a:font script="Syrj" typeface="Estrangelo Edessa"/>
+        <a:font script="Syre" typeface="Estrangelo Edessa"/>
+        <a:font script="Sora" typeface="Nirmala UI"/>
+        <a:font script="Tale" typeface="Microsoft Tai Le"/>
+        <a:font script="Talu" typeface="Microsoft New Tai Lue"/>
+        <a:font script="Tfng" typeface="Ebrima"/>
+      </a:minorFont>
+    </a:fontScheme>
+    <a:fmtScheme name="Office">
+      <a:fillStyleLst>
+        <a:solidFill>
+          <a:schemeClr val="phClr"/>
+        </a:solidFill>
+        <a:gradFill rotWithShape="1">
+          <a:gsLst>
+            <a:gs pos="0">
+              <a:schemeClr val="phClr">
+                <a:lumMod val="110000"/>
+                <a:satMod val="105000"/>
+                <a:tint val="67000"/>
+              </a:schemeClr>
+            </a:gs>
+            <a:gs pos="50000">
+              <a:schemeClr val="phClr">
+                <a:lumMod val="105000"/>
+                <a:satMod val="103000"/>
+                <a:tint val="73000"/>
+              </a:schemeClr>
+            </a:gs>
+            <a:gs pos="100000">
+              <a:schemeClr val="phClr">
+                <a:lumMod val="105000"/>
+                <a:satMod val="109000"/>
+                <a:tint val="81000"/>
+              </a:schemeClr>
+            </a:gs>
+          </a:gsLst>
+          <a:lin ang="5400000" scaled="0"/>
+        </a:gradFill>
+        <a:gradFill rotWithShape="1">
+          <a:gsLst>
+            <a:gs pos="0">
+              <a:schemeClr val="phClr">
+                <a:satMod val="103000"/>
+                <a:lumMod val="102000"/>
+                <a:tint val="94000"/>
+              </a:schemeClr>
+            </a:gs>
+            <a:gs pos="50000">
+              <a:schemeClr val="phClr">
+                <a:satMod val="110000"/>
+                <a:lumMod val="100000"/>
+                <a:shade val="100000"/>
+              </a:schemeClr>
+            </a:gs>
+            <a:gs pos="100000">
+              <a:schemeClr val="phClr">
+                <a:lumMod val="99000"/>
+                <a:satMod val="120000"/>
+                <a:shade val="78000"/>
+              </a:schemeClr>
+            </a:gs>
+          </a:gsLst>
+          <a:lin ang="5400000" scaled="0"/>
+        </a:gradFill>
+      </a:fillStyleLst>
+      <a:lnStyleLst>
+        <a:ln w="6350" cap="flat" cmpd="sng" algn="ctr">
+          <a:solidFill>
+            <a:schemeClr val="phClr"/>
+          </a:solidFill>
+          <a:prstDash val="solid"/>
+          <a:miter lim="800000"/>
+        </a:ln>
+        <a:ln w="12700" cap="flat" cmpd="sng" algn="ctr">
+          <a:solidFill>
+            <a:schemeClr val="phClr"/>
+          </a:solidFill>
+          <a:prstDash val="solid"/>
+          <a:miter lim="800000"/>
+        </a:ln>
+        <a:ln w="19050" cap="flat" cmpd="sng" algn="ctr">
+          <a:solidFill>
+            <a:schemeClr val="phClr"/>
+          </a:solidFill>
+          <a:prstDash val="solid"/>
+          <a:miter lim="800000"/>
+        </a:ln>
+      </a:lnStyleLst>
+      <a:effectStyleLst>
+        <a:effectStyle>
+          <a:effectLst/>
+        </a:effectStyle>
+        <a:effectStyle>
+          <a:effectLst/>
+        </a:effectStyle>
+        <a:effectStyle>
+          <a:effectLst>
+            <a:outerShdw blurRad="57150" dist="19050" dir="5400000" algn="ctr" rotWithShape="0">
+              <a:srgbClr val="000000">
+                <a:alpha val="63000"/>
+              </a:srgbClr>
+            </a:outerShdw>
+          </a:effectLst>
+        </a:effectStyle>
+      </a:effectStyleLst>
+      <a:bgFillStyleLst>
+        <a:solidFill>
+          <a:schemeClr val="phClr"/>
+        </a:solidFill>
+        <a:solidFill>
+          <a:schemeClr val="phClr">
+            <a:tint val="95000"/>
+            <a:satMod val="170000"/>
+          </a:schemeClr>
+        </a:solidFill>
+        <a:gradFill rotWithShape="1">
+          <a:gsLst>
+            <a:gs pos="0">
+              <a:schemeClr val="phClr">
+                <a:tint val="93000"/>
+                <a:satMod val="150000"/>
+                <a:shade val="98000"/>
+                <a:lumMod val="102000"/>
+              </a:schemeClr>
+            </a:gs>
+            <a:gs pos="50000">
+              <a:schemeClr val="phClr">
+                <a:tint val="98000"/>
+                <a:satMod val="130000"/>
+                <a:shade val="90000"/>
+                <a:lumMod val="103000"/>
+              </a:schemeClr>
+            </a:gs>
+            <a:gs pos="100000">
+              <a:schemeClr val="phClr">
+                <a:shade val="63000"/>
+                <a:satMod val="120000"/>
+              </a:schemeClr>
+            </a:gs>
+          </a:gsLst>
+          <a:lin ang="5400000" scaled="0"/>
+        </a:gradFill>
+      </a:bgFillStyleLst>
+    </a:fmtScheme>
+  </a:themeElements>
+  <a:objectDefaults/>
+  <a:extraClrSchemeLst/>
+  <a:extLst>
+    <a:ext uri="{05A4C25C-085E-4340-85A3-A5531E510DB2}">
+      <thm15:themeFamily xmlns:thm15="http://schemas.microsoft.com/office/thememl/2012/main" name="Office Theme" id="{62F939B6-93AF-4DB8-9C6B-D6C7DFDC589F}" vid="{4A3C46E8-61CC-4603-A589-7422A47A8E4A}"/>
+    </a:ext>
+  </a:extLst>
+</a:theme>
 </file>
</xml_diff>